<commit_message>
Finished Presentation of Trend Analysis results and added notes to trend analysis code.
</commit_message>
<xml_diff>
--- a/Trend-Analysis-of-Priest-Lake-Water-Temperature-Data.pptx
+++ b/Trend-Analysis-of-Priest-Lake-Water-Temperature-Data.pptx
@@ -1,6 +1,6 @@
 
 <file path=ppt/presentation.xml><?xml version="1.0" encoding="utf-8"?>
-<p:presentation xmlns:a="http://schemas.openxmlformats.org/drawingml/2006/main" xmlns:p="http://schemas.openxmlformats.org/presentationml/2006/main" xmlns:r="http://schemas.openxmlformats.org/officeDocument/2006/relationships" autoCompressPictures="0" saveSubsetFonts="1">
+<p:presentation xmlns:a="http://schemas.openxmlformats.org/drawingml/2006/main" xmlns:r="http://schemas.openxmlformats.org/officeDocument/2006/relationships" xmlns:p="http://schemas.openxmlformats.org/presentationml/2006/main" saveSubsetFonts="1" autoCompressPictures="0">
   <p:sldMasterIdLst>
     <p:sldMasterId id="2147483648" r:id="rId1"/>
   </p:sldMasterIdLst>
@@ -10,6 +10,21 @@
     <p:sldId id="258" r:id="rId4"/>
     <p:sldId id="259" r:id="rId5"/>
     <p:sldId id="260" r:id="rId6"/>
+    <p:sldId id="261" r:id="rId7"/>
+    <p:sldId id="262" r:id="rId8"/>
+    <p:sldId id="263" r:id="rId9"/>
+    <p:sldId id="264" r:id="rId10"/>
+    <p:sldId id="265" r:id="rId11"/>
+    <p:sldId id="266" r:id="rId12"/>
+    <p:sldId id="267" r:id="rId13"/>
+    <p:sldId id="268" r:id="rId14"/>
+    <p:sldId id="269" r:id="rId15"/>
+    <p:sldId id="270" r:id="rId16"/>
+    <p:sldId id="271" r:id="rId17"/>
+    <p:sldId id="272" r:id="rId18"/>
+    <p:sldId id="273" r:id="rId19"/>
+    <p:sldId id="274" r:id="rId20"/>
+    <p:sldId id="275" r:id="rId21"/>
   </p:sldIdLst>
   <p:sldSz cx="9144000" cy="5143500" type="screen16x9"/>
   <p:notesSz cx="6858000" cy="9144000"/>
@@ -17,8 +32,8 @@
     <a:defPPr>
       <a:defRPr lang="en-US"/>
     </a:defPPr>
-    <a:lvl1pPr algn="l" defTabSz="457200" eaLnBrk="1" hangingPunct="1" latinLnBrk="0" marL="0" rtl="0">
-      <a:defRPr kern="1200" sz="1800">
+    <a:lvl1pPr marL="0" algn="l" defTabSz="457200" rtl="0" eaLnBrk="1" latinLnBrk="0" hangingPunct="1">
+      <a:defRPr sz="1800" kern="1200">
         <a:solidFill>
           <a:schemeClr val="tx1"/>
         </a:solidFill>
@@ -27,8 +42,8 @@
         <a:cs typeface="+mn-cs"/>
       </a:defRPr>
     </a:lvl1pPr>
-    <a:lvl2pPr algn="l" defTabSz="457200" eaLnBrk="1" hangingPunct="1" latinLnBrk="0" marL="457200" rtl="0">
-      <a:defRPr kern="1200" sz="1800">
+    <a:lvl2pPr marL="457200" algn="l" defTabSz="457200" rtl="0" eaLnBrk="1" latinLnBrk="0" hangingPunct="1">
+      <a:defRPr sz="1800" kern="1200">
         <a:solidFill>
           <a:schemeClr val="tx1"/>
         </a:solidFill>
@@ -37,8 +52,8 @@
         <a:cs typeface="+mn-cs"/>
       </a:defRPr>
     </a:lvl2pPr>
-    <a:lvl3pPr algn="l" defTabSz="457200" eaLnBrk="1" hangingPunct="1" latinLnBrk="0" marL="914400" rtl="0">
-      <a:defRPr kern="1200" sz="1800">
+    <a:lvl3pPr marL="914400" algn="l" defTabSz="457200" rtl="0" eaLnBrk="1" latinLnBrk="0" hangingPunct="1">
+      <a:defRPr sz="1800" kern="1200">
         <a:solidFill>
           <a:schemeClr val="tx1"/>
         </a:solidFill>
@@ -47,8 +62,8 @@
         <a:cs typeface="+mn-cs"/>
       </a:defRPr>
     </a:lvl3pPr>
-    <a:lvl4pPr algn="l" defTabSz="457200" eaLnBrk="1" hangingPunct="1" latinLnBrk="0" marL="1371600" rtl="0">
-      <a:defRPr kern="1200" sz="1800">
+    <a:lvl4pPr marL="1371600" algn="l" defTabSz="457200" rtl="0" eaLnBrk="1" latinLnBrk="0" hangingPunct="1">
+      <a:defRPr sz="1800" kern="1200">
         <a:solidFill>
           <a:schemeClr val="tx1"/>
         </a:solidFill>
@@ -57,8 +72,8 @@
         <a:cs typeface="+mn-cs"/>
       </a:defRPr>
     </a:lvl4pPr>
-    <a:lvl5pPr algn="l" defTabSz="457200" eaLnBrk="1" hangingPunct="1" latinLnBrk="0" marL="1828800" rtl="0">
-      <a:defRPr kern="1200" sz="1800">
+    <a:lvl5pPr marL="1828800" algn="l" defTabSz="457200" rtl="0" eaLnBrk="1" latinLnBrk="0" hangingPunct="1">
+      <a:defRPr sz="1800" kern="1200">
         <a:solidFill>
           <a:schemeClr val="tx1"/>
         </a:solidFill>
@@ -67,8 +82,8 @@
         <a:cs typeface="+mn-cs"/>
       </a:defRPr>
     </a:lvl5pPr>
-    <a:lvl6pPr algn="l" defTabSz="457200" eaLnBrk="1" hangingPunct="1" latinLnBrk="0" marL="2286000" rtl="0">
-      <a:defRPr kern="1200" sz="1800">
+    <a:lvl6pPr marL="2286000" algn="l" defTabSz="457200" rtl="0" eaLnBrk="1" latinLnBrk="0" hangingPunct="1">
+      <a:defRPr sz="1800" kern="1200">
         <a:solidFill>
           <a:schemeClr val="tx1"/>
         </a:solidFill>
@@ -77,8 +92,8 @@
         <a:cs typeface="+mn-cs"/>
       </a:defRPr>
     </a:lvl6pPr>
-    <a:lvl7pPr algn="l" defTabSz="457200" eaLnBrk="1" hangingPunct="1" latinLnBrk="0" marL="2743200" rtl="0">
-      <a:defRPr kern="1200" sz="1800">
+    <a:lvl7pPr marL="2743200" algn="l" defTabSz="457200" rtl="0" eaLnBrk="1" latinLnBrk="0" hangingPunct="1">
+      <a:defRPr sz="1800" kern="1200">
         <a:solidFill>
           <a:schemeClr val="tx1"/>
         </a:solidFill>
@@ -87,8 +102,8 @@
         <a:cs typeface="+mn-cs"/>
       </a:defRPr>
     </a:lvl7pPr>
-    <a:lvl8pPr algn="l" defTabSz="457200" eaLnBrk="1" hangingPunct="1" latinLnBrk="0" marL="3200400" rtl="0">
-      <a:defRPr kern="1200" sz="1800">
+    <a:lvl8pPr marL="3200400" algn="l" defTabSz="457200" rtl="0" eaLnBrk="1" latinLnBrk="0" hangingPunct="1">
+      <a:defRPr sz="1800" kern="1200">
         <a:solidFill>
           <a:schemeClr val="tx1"/>
         </a:solidFill>
@@ -97,8 +112,8 @@
         <a:cs typeface="+mn-cs"/>
       </a:defRPr>
     </a:lvl8pPr>
-    <a:lvl9pPr algn="l" defTabSz="457200" eaLnBrk="1" hangingPunct="1" latinLnBrk="0" marL="3657600" rtl="0">
-      <a:defRPr kern="1200" sz="1800">
+    <a:lvl9pPr marL="3657600" algn="l" defTabSz="457200" rtl="0" eaLnBrk="1" latinLnBrk="0" hangingPunct="1">
+      <a:defRPr sz="1800" kern="1200">
         <a:solidFill>
           <a:schemeClr val="tx1"/>
         </a:solidFill>
@@ -306,7 +321,7 @@
           <a:p>
             <a:fld id="{241EB5C9-1307-BA42-ABA2-0BC069CD8E7F}" type="datetimeFigureOut">
               <a:rPr lang="en-US" smtClean="0"/>
-              <a:t>1/2/22</a:t>
+              <a:t>1/9/25</a:t>
             </a:fld>
             <a:endParaRPr lang="en-US"/>
           </a:p>
@@ -474,7 +489,7 @@
           <a:p>
             <a:fld id="{241EB5C9-1307-BA42-ABA2-0BC069CD8E7F}" type="datetimeFigureOut">
               <a:rPr lang="en-US" smtClean="0"/>
-              <a:t>1/2/22</a:t>
+              <a:t>1/9/25</a:t>
             </a:fld>
             <a:endParaRPr lang="en-US"/>
           </a:p>
@@ -652,7 +667,7 @@
           <a:p>
             <a:fld id="{241EB5C9-1307-BA42-ABA2-0BC069CD8E7F}" type="datetimeFigureOut">
               <a:rPr lang="en-US" smtClean="0"/>
-              <a:t>1/2/22</a:t>
+              <a:t>1/9/25</a:t>
             </a:fld>
             <a:endParaRPr lang="en-US"/>
           </a:p>
@@ -820,7 +835,7 @@
           <a:p>
             <a:fld id="{241EB5C9-1307-BA42-ABA2-0BC069CD8E7F}" type="datetimeFigureOut">
               <a:rPr lang="en-US" smtClean="0"/>
-              <a:t>1/2/22</a:t>
+              <a:t>1/9/25</a:t>
             </a:fld>
             <a:endParaRPr lang="en-US"/>
           </a:p>
@@ -1065,7 +1080,7 @@
           <a:p>
             <a:fld id="{241EB5C9-1307-BA42-ABA2-0BC069CD8E7F}" type="datetimeFigureOut">
               <a:rPr lang="en-US" smtClean="0"/>
-              <a:t>1/2/22</a:t>
+              <a:t>1/9/25</a:t>
             </a:fld>
             <a:endParaRPr lang="en-US"/>
           </a:p>
@@ -1350,7 +1365,7 @@
           <a:p>
             <a:fld id="{241EB5C9-1307-BA42-ABA2-0BC069CD8E7F}" type="datetimeFigureOut">
               <a:rPr lang="en-US" smtClean="0"/>
-              <a:t>1/2/22</a:t>
+              <a:t>1/9/25</a:t>
             </a:fld>
             <a:endParaRPr lang="en-US"/>
           </a:p>
@@ -1769,7 +1784,7 @@
           <a:p>
             <a:fld id="{241EB5C9-1307-BA42-ABA2-0BC069CD8E7F}" type="datetimeFigureOut">
               <a:rPr lang="en-US" smtClean="0"/>
-              <a:t>1/2/22</a:t>
+              <a:t>1/9/25</a:t>
             </a:fld>
             <a:endParaRPr lang="en-US"/>
           </a:p>
@@ -1886,7 +1901,7 @@
           <a:p>
             <a:fld id="{241EB5C9-1307-BA42-ABA2-0BC069CD8E7F}" type="datetimeFigureOut">
               <a:rPr lang="en-US" smtClean="0"/>
-              <a:t>1/2/22</a:t>
+              <a:t>1/9/25</a:t>
             </a:fld>
             <a:endParaRPr lang="en-US"/>
           </a:p>
@@ -1981,7 +1996,7 @@
           <a:p>
             <a:fld id="{241EB5C9-1307-BA42-ABA2-0BC069CD8E7F}" type="datetimeFigureOut">
               <a:rPr lang="en-US" smtClean="0"/>
-              <a:t>1/2/22</a:t>
+              <a:t>1/9/25</a:t>
             </a:fld>
             <a:endParaRPr lang="en-US"/>
           </a:p>
@@ -2256,7 +2271,7 @@
           <a:p>
             <a:fld id="{241EB5C9-1307-BA42-ABA2-0BC069CD8E7F}" type="datetimeFigureOut">
               <a:rPr lang="en-US" smtClean="0"/>
-              <a:t>1/2/22</a:t>
+              <a:t>1/9/25</a:t>
             </a:fld>
             <a:endParaRPr lang="en-US"/>
           </a:p>
@@ -2508,7 +2523,7 @@
           <a:p>
             <a:fld id="{241EB5C9-1307-BA42-ABA2-0BC069CD8E7F}" type="datetimeFigureOut">
               <a:rPr lang="en-US" smtClean="0"/>
-              <a:t>1/2/22</a:t>
+              <a:t>1/9/25</a:t>
             </a:fld>
             <a:endParaRPr lang="en-US"/>
           </a:p>
@@ -2570,7 +2585,7 @@
 </file>
 
 <file path=ppt/slideMasters/slideMaster1.xml><?xml version="1.0" encoding="utf-8"?>
-<p:sldMaster xmlns:a="http://schemas.openxmlformats.org/drawingml/2006/main" xmlns:p="http://schemas.openxmlformats.org/presentationml/2006/main" xmlns:r="http://schemas.openxmlformats.org/officeDocument/2006/relationships">
+<p:sldMaster xmlns:a="http://schemas.openxmlformats.org/drawingml/2006/main" xmlns:r="http://schemas.openxmlformats.org/officeDocument/2006/relationships" xmlns:p="http://schemas.openxmlformats.org/presentationml/2006/main">
   <p:cSld>
     <p:bg>
       <p:bgRef idx="1001">
@@ -2611,7 +2626,7 @@
           </a:prstGeom>
         </p:spPr>
         <p:txBody>
-          <a:bodyPr anchor="ctr" bIns="45720" lIns="91440" rIns="91440" rtlCol="0" tIns="45720" vert="horz">
+          <a:bodyPr vert="horz" lIns="91440" tIns="45720" rIns="91440" bIns="45720" rtlCol="0" anchor="ctr">
             <a:normAutofit/>
           </a:bodyPr>
           <a:lstStyle/>
@@ -2630,7 +2645,7 @@
             <a:spLocks noGrp="1"/>
           </p:cNvSpPr>
           <p:nvPr>
-            <p:ph idx="1" type="body"/>
+            <p:ph type="body" idx="1"/>
           </p:nvPr>
         </p:nvSpPr>
         <p:spPr>
@@ -2643,7 +2658,7 @@
           </a:prstGeom>
         </p:spPr>
         <p:txBody>
-          <a:bodyPr bIns="45720" lIns="91440" rIns="91440" rtlCol="0" tIns="45720" vert="horz">
+          <a:bodyPr vert="horz" lIns="91440" tIns="45720" rIns="91440" bIns="45720" rtlCol="0">
             <a:normAutofit/>
           </a:bodyPr>
           <a:lstStyle/>
@@ -2691,7 +2706,7 @@
             <a:spLocks noGrp="1"/>
           </p:cNvSpPr>
           <p:nvPr>
-            <p:ph idx="2" sz="half" type="dt"/>
+            <p:ph type="dt" sz="half" idx="2"/>
           </p:nvPr>
         </p:nvSpPr>
         <p:spPr>
@@ -2704,7 +2719,7 @@
           </a:prstGeom>
         </p:spPr>
         <p:txBody>
-          <a:bodyPr anchor="ctr" bIns="45720" lIns="91440" rIns="91440" rtlCol="0" tIns="45720" vert="horz"/>
+          <a:bodyPr vert="horz" lIns="91440" tIns="45720" rIns="91440" bIns="45720" rtlCol="0" anchor="ctr"/>
           <a:lstStyle>
             <a:lvl1pPr algn="l">
               <a:defRPr sz="900">
@@ -2719,7 +2734,7 @@
           <a:p>
             <a:fld id="{241EB5C9-1307-BA42-ABA2-0BC069CD8E7F}" type="datetimeFigureOut">
               <a:rPr lang="en-US" smtClean="0"/>
-              <a:t>1/2/22</a:t>
+              <a:t>1/9/25</a:t>
             </a:fld>
             <a:endParaRPr lang="en-US"/>
           </a:p>
@@ -2732,7 +2747,7 @@
             <a:spLocks noGrp="1"/>
           </p:cNvSpPr>
           <p:nvPr>
-            <p:ph idx="3" sz="quarter" type="ftr"/>
+            <p:ph type="ftr" sz="quarter" idx="3"/>
           </p:nvPr>
         </p:nvSpPr>
         <p:spPr>
@@ -2745,7 +2760,7 @@
           </a:prstGeom>
         </p:spPr>
         <p:txBody>
-          <a:bodyPr anchor="ctr" bIns="45720" lIns="91440" rIns="91440" rtlCol="0" tIns="45720" vert="horz"/>
+          <a:bodyPr vert="horz" lIns="91440" tIns="45720" rIns="91440" bIns="45720" rtlCol="0" anchor="ctr"/>
           <a:lstStyle>
             <a:lvl1pPr algn="ctr">
               <a:defRPr sz="900">
@@ -2769,7 +2784,7 @@
             <a:spLocks noGrp="1"/>
           </p:cNvSpPr>
           <p:nvPr>
-            <p:ph idx="4" sz="quarter" type="sldNum"/>
+            <p:ph type="sldNum" sz="quarter" idx="4"/>
           </p:nvPr>
         </p:nvSpPr>
         <p:spPr>
@@ -2782,7 +2797,7 @@
           </a:prstGeom>
         </p:spPr>
         <p:txBody>
-          <a:bodyPr anchor="ctr" bIns="45720" lIns="91440" rIns="91440" rtlCol="0" tIns="45720" vert="horz"/>
+          <a:bodyPr vert="horz" lIns="91440" tIns="45720" rIns="91440" bIns="45720" rtlCol="0" anchor="ctr"/>
           <a:lstStyle>
             <a:lvl1pPr algn="r">
               <a:defRPr sz="900">
@@ -2810,7 +2825,7 @@
       </p:ext>
     </p:extLst>
   </p:cSld>
-  <p:clrMap accent1="accent1" accent2="accent2" accent3="accent3" accent4="accent4" accent5="accent5" accent6="accent6" bg1="lt1" bg2="lt2" folHlink="folHlink" hlink="hlink" tx1="dk1" tx2="dk2"/>
+  <p:clrMap bg1="lt1" tx1="dk1" bg2="lt2" tx2="dk2" accent1="accent1" accent2="accent2" accent3="accent3" accent4="accent4" accent5="accent5" accent6="accent6" hlink="hlink" folHlink="folHlink"/>
   <p:sldLayoutIdLst>
     <p:sldLayoutId id="2147483649" r:id="rId1"/>
     <p:sldLayoutId id="2147483650" r:id="rId2"/>
@@ -2826,12 +2841,12 @@
   </p:sldLayoutIdLst>
   <p:txStyles>
     <p:titleStyle>
-      <a:lvl1pPr algn="ctr" defTabSz="342900" eaLnBrk="1" hangingPunct="1" latinLnBrk="0" rtl="0">
+      <a:lvl1pPr algn="ctr" defTabSz="342900" rtl="0" eaLnBrk="1" latinLnBrk="0" hangingPunct="1">
         <a:spcBef>
           <a:spcPct val="0"/>
         </a:spcBef>
         <a:buNone/>
-        <a:defRPr kern="1200" sz="3300">
+        <a:defRPr sz="3300" kern="1200">
           <a:solidFill>
             <a:schemeClr val="tx1"/>
           </a:solidFill>
@@ -2842,13 +2857,13 @@
       </a:lvl1pPr>
     </p:titleStyle>
     <p:bodyStyle>
-      <a:lvl1pPr algn="l" defTabSz="342900" eaLnBrk="1" hangingPunct="1" indent="-342900" latinLnBrk="0" marL="342900" rtl="0">
+      <a:lvl1pPr marL="342900" indent="-342900" algn="l" defTabSz="342900" rtl="0" eaLnBrk="1" latinLnBrk="0" hangingPunct="1">
         <a:spcBef>
           <a:spcPct val="20000"/>
         </a:spcBef>
         <a:buFont typeface="Arial"/>
         <a:buChar char="•"/>
-        <a:defRPr kern="1200" sz="2400">
+        <a:defRPr sz="2400" kern="1200">
           <a:solidFill>
             <a:schemeClr val="tx1"/>
           </a:solidFill>
@@ -2857,13 +2872,13 @@
           <a:cs typeface="+mn-cs"/>
         </a:defRPr>
       </a:lvl1pPr>
-      <a:lvl2pPr algn="l" defTabSz="342900" eaLnBrk="1" hangingPunct="1" indent="-342900" latinLnBrk="0" marL="685800" rtl="0">
+      <a:lvl2pPr marL="685800" indent="-342900" algn="l" defTabSz="342900" rtl="0" eaLnBrk="1" latinLnBrk="0" hangingPunct="1">
         <a:spcBef>
           <a:spcPct val="20000"/>
         </a:spcBef>
         <a:buFont typeface="Arial"/>
         <a:buChar char="–"/>
-        <a:defRPr kern="1200" sz="2100">
+        <a:defRPr sz="2100" kern="1200">
           <a:solidFill>
             <a:schemeClr val="tx1"/>
           </a:solidFill>
@@ -2872,13 +2887,13 @@
           <a:cs typeface="+mn-cs"/>
         </a:defRPr>
       </a:lvl2pPr>
-      <a:lvl3pPr algn="l" defTabSz="342900" eaLnBrk="1" hangingPunct="1" indent="-342900" latinLnBrk="0" marL="1028700" rtl="0">
+      <a:lvl3pPr marL="1028700" indent="-342900" algn="l" defTabSz="342900" rtl="0" eaLnBrk="1" latinLnBrk="0" hangingPunct="1">
         <a:spcBef>
           <a:spcPct val="20000"/>
         </a:spcBef>
         <a:buFont typeface="Arial"/>
         <a:buChar char="•"/>
-        <a:defRPr kern="1200" sz="1800">
+        <a:defRPr sz="1800" kern="1200">
           <a:solidFill>
             <a:schemeClr val="tx1"/>
           </a:solidFill>
@@ -2887,13 +2902,13 @@
           <a:cs typeface="+mn-cs"/>
         </a:defRPr>
       </a:lvl3pPr>
-      <a:lvl4pPr algn="l" defTabSz="342900" eaLnBrk="1" hangingPunct="1" indent="-342900" latinLnBrk="0" marL="1371600" rtl="0">
+      <a:lvl4pPr marL="1371600" indent="-342900" algn="l" defTabSz="342900" rtl="0" eaLnBrk="1" latinLnBrk="0" hangingPunct="1">
         <a:spcBef>
           <a:spcPct val="20000"/>
         </a:spcBef>
         <a:buFont typeface="Arial"/>
         <a:buChar char="–"/>
-        <a:defRPr kern="1200" sz="1500">
+        <a:defRPr sz="1500" kern="1200">
           <a:solidFill>
             <a:schemeClr val="tx1"/>
           </a:solidFill>
@@ -2902,13 +2917,13 @@
           <a:cs typeface="+mn-cs"/>
         </a:defRPr>
       </a:lvl4pPr>
-      <a:lvl5pPr algn="l" defTabSz="342900" eaLnBrk="1" hangingPunct="1" indent="-342900" latinLnBrk="0" marL="1714500" rtl="0">
+      <a:lvl5pPr marL="1714500" indent="-342900" algn="l" defTabSz="342900" rtl="0" eaLnBrk="1" latinLnBrk="0" hangingPunct="1">
         <a:spcBef>
           <a:spcPct val="20000"/>
         </a:spcBef>
         <a:buFont typeface="Arial"/>
         <a:buChar char="»"/>
-        <a:defRPr kern="1200" sz="1500">
+        <a:defRPr sz="1500" kern="1200">
           <a:solidFill>
             <a:schemeClr val="tx1"/>
           </a:solidFill>
@@ -2917,13 +2932,13 @@
           <a:cs typeface="+mn-cs"/>
         </a:defRPr>
       </a:lvl5pPr>
-      <a:lvl6pPr algn="l" defTabSz="342900" eaLnBrk="1" hangingPunct="1" indent="-342900" latinLnBrk="0" marL="2057400" rtl="0">
+      <a:lvl6pPr marL="2057400" indent="-342900" algn="l" defTabSz="342900" rtl="0" eaLnBrk="1" latinLnBrk="0" hangingPunct="1">
         <a:spcBef>
           <a:spcPct val="20000"/>
         </a:spcBef>
         <a:buFont typeface="Arial"/>
         <a:buChar char="•"/>
-        <a:defRPr kern="1200" sz="1500">
+        <a:defRPr sz="1500" kern="1200">
           <a:solidFill>
             <a:schemeClr val="tx1"/>
           </a:solidFill>
@@ -2932,13 +2947,13 @@
           <a:cs typeface="+mn-cs"/>
         </a:defRPr>
       </a:lvl6pPr>
-      <a:lvl7pPr algn="l" defTabSz="342900" eaLnBrk="1" hangingPunct="1" indent="-342900" latinLnBrk="0" marL="2400300" rtl="0">
+      <a:lvl7pPr marL="2400300" indent="-342900" algn="l" defTabSz="342900" rtl="0" eaLnBrk="1" latinLnBrk="0" hangingPunct="1">
         <a:spcBef>
           <a:spcPct val="20000"/>
         </a:spcBef>
         <a:buFont typeface="Arial"/>
         <a:buChar char="•"/>
-        <a:defRPr kern="1200" sz="1500">
+        <a:defRPr sz="1500" kern="1200">
           <a:solidFill>
             <a:schemeClr val="tx1"/>
           </a:solidFill>
@@ -2947,13 +2962,13 @@
           <a:cs typeface="+mn-cs"/>
         </a:defRPr>
       </a:lvl7pPr>
-      <a:lvl8pPr algn="l" defTabSz="342900" eaLnBrk="1" hangingPunct="1" indent="-342900" latinLnBrk="0" marL="2743200" rtl="0">
+      <a:lvl8pPr marL="2743200" indent="-342900" algn="l" defTabSz="342900" rtl="0" eaLnBrk="1" latinLnBrk="0" hangingPunct="1">
         <a:spcBef>
           <a:spcPct val="20000"/>
         </a:spcBef>
         <a:buFont typeface="Arial"/>
         <a:buChar char="•"/>
-        <a:defRPr kern="1200" sz="1500">
+        <a:defRPr sz="1500" kern="1200">
           <a:solidFill>
             <a:schemeClr val="tx1"/>
           </a:solidFill>
@@ -2962,13 +2977,13 @@
           <a:cs typeface="+mn-cs"/>
         </a:defRPr>
       </a:lvl8pPr>
-      <a:lvl9pPr algn="l" defTabSz="342900" eaLnBrk="1" hangingPunct="1" indent="-342900" latinLnBrk="0" marL="3086100" rtl="0">
+      <a:lvl9pPr marL="3086100" indent="-342900" algn="l" defTabSz="342900" rtl="0" eaLnBrk="1" latinLnBrk="0" hangingPunct="1">
         <a:spcBef>
           <a:spcPct val="20000"/>
         </a:spcBef>
         <a:buFont typeface="Arial"/>
         <a:buChar char="•"/>
-        <a:defRPr kern="1200" sz="1500">
+        <a:defRPr sz="1500" kern="1200">
           <a:solidFill>
             <a:schemeClr val="tx1"/>
           </a:solidFill>
@@ -2982,8 +2997,8 @@
       <a:defPPr>
         <a:defRPr lang="en-US"/>
       </a:defPPr>
-      <a:lvl1pPr algn="l" defTabSz="342900" eaLnBrk="1" hangingPunct="1" latinLnBrk="0" marL="0" rtl="0">
-        <a:defRPr kern="1200" sz="1350">
+      <a:lvl1pPr marL="0" algn="l" defTabSz="342900" rtl="0" eaLnBrk="1" latinLnBrk="0" hangingPunct="1">
+        <a:defRPr sz="1350" kern="1200">
           <a:solidFill>
             <a:schemeClr val="tx1"/>
           </a:solidFill>
@@ -2992,8 +3007,8 @@
           <a:cs typeface="+mn-cs"/>
         </a:defRPr>
       </a:lvl1pPr>
-      <a:lvl2pPr algn="l" defTabSz="342900" eaLnBrk="1" hangingPunct="1" latinLnBrk="0" marL="342900" rtl="0">
-        <a:defRPr kern="1200" sz="1350">
+      <a:lvl2pPr marL="342900" algn="l" defTabSz="342900" rtl="0" eaLnBrk="1" latinLnBrk="0" hangingPunct="1">
+        <a:defRPr sz="1350" kern="1200">
           <a:solidFill>
             <a:schemeClr val="tx1"/>
           </a:solidFill>
@@ -3002,8 +3017,8 @@
           <a:cs typeface="+mn-cs"/>
         </a:defRPr>
       </a:lvl2pPr>
-      <a:lvl3pPr algn="l" defTabSz="342900" eaLnBrk="1" hangingPunct="1" latinLnBrk="0" marL="685800" rtl="0">
-        <a:defRPr kern="1200" sz="1350">
+      <a:lvl3pPr marL="685800" algn="l" defTabSz="342900" rtl="0" eaLnBrk="1" latinLnBrk="0" hangingPunct="1">
+        <a:defRPr sz="1350" kern="1200">
           <a:solidFill>
             <a:schemeClr val="tx1"/>
           </a:solidFill>
@@ -3012,8 +3027,8 @@
           <a:cs typeface="+mn-cs"/>
         </a:defRPr>
       </a:lvl3pPr>
-      <a:lvl4pPr algn="l" defTabSz="342900" eaLnBrk="1" hangingPunct="1" latinLnBrk="0" marL="1028700" rtl="0">
-        <a:defRPr kern="1200" sz="1350">
+      <a:lvl4pPr marL="1028700" algn="l" defTabSz="342900" rtl="0" eaLnBrk="1" latinLnBrk="0" hangingPunct="1">
+        <a:defRPr sz="1350" kern="1200">
           <a:solidFill>
             <a:schemeClr val="tx1"/>
           </a:solidFill>
@@ -3022,8 +3037,8 @@
           <a:cs typeface="+mn-cs"/>
         </a:defRPr>
       </a:lvl4pPr>
-      <a:lvl5pPr algn="l" defTabSz="342900" eaLnBrk="1" hangingPunct="1" latinLnBrk="0" marL="1371600" rtl="0">
-        <a:defRPr kern="1200" sz="1350">
+      <a:lvl5pPr marL="1371600" algn="l" defTabSz="342900" rtl="0" eaLnBrk="1" latinLnBrk="0" hangingPunct="1">
+        <a:defRPr sz="1350" kern="1200">
           <a:solidFill>
             <a:schemeClr val="tx1"/>
           </a:solidFill>
@@ -3032,8 +3047,8 @@
           <a:cs typeface="+mn-cs"/>
         </a:defRPr>
       </a:lvl5pPr>
-      <a:lvl6pPr algn="l" defTabSz="342900" eaLnBrk="1" hangingPunct="1" latinLnBrk="0" marL="1714500" rtl="0">
-        <a:defRPr kern="1200" sz="1350">
+      <a:lvl6pPr marL="1714500" algn="l" defTabSz="342900" rtl="0" eaLnBrk="1" latinLnBrk="0" hangingPunct="1">
+        <a:defRPr sz="1350" kern="1200">
           <a:solidFill>
             <a:schemeClr val="tx1"/>
           </a:solidFill>
@@ -3042,8 +3057,8 @@
           <a:cs typeface="+mn-cs"/>
         </a:defRPr>
       </a:lvl6pPr>
-      <a:lvl7pPr algn="l" defTabSz="342900" eaLnBrk="1" hangingPunct="1" latinLnBrk="0" marL="2057400" rtl="0">
-        <a:defRPr kern="1200" sz="1350">
+      <a:lvl7pPr marL="2057400" algn="l" defTabSz="342900" rtl="0" eaLnBrk="1" latinLnBrk="0" hangingPunct="1">
+        <a:defRPr sz="1350" kern="1200">
           <a:solidFill>
             <a:schemeClr val="tx1"/>
           </a:solidFill>
@@ -3052,8 +3067,8 @@
           <a:cs typeface="+mn-cs"/>
         </a:defRPr>
       </a:lvl7pPr>
-      <a:lvl8pPr algn="l" defTabSz="342900" eaLnBrk="1" hangingPunct="1" latinLnBrk="0" marL="2400300" rtl="0">
-        <a:defRPr kern="1200" sz="1350">
+      <a:lvl8pPr marL="2400300" algn="l" defTabSz="342900" rtl="0" eaLnBrk="1" latinLnBrk="0" hangingPunct="1">
+        <a:defRPr sz="1350" kern="1200">
           <a:solidFill>
             <a:schemeClr val="tx1"/>
           </a:solidFill>
@@ -3062,8 +3077,8 @@
           <a:cs typeface="+mn-cs"/>
         </a:defRPr>
       </a:lvl8pPr>
-      <a:lvl9pPr algn="l" defTabSz="342900" eaLnBrk="1" hangingPunct="1" latinLnBrk="0" marL="2743200" rtl="0">
-        <a:defRPr kern="1200" sz="1350">
+      <a:lvl9pPr marL="2743200" algn="l" defTabSz="342900" rtl="0" eaLnBrk="1" latinLnBrk="0" hangingPunct="1">
+        <a:defRPr sz="1350" kern="1200">
           <a:solidFill>
             <a:schemeClr val="tx1"/>
           </a:solidFill>
@@ -3094,88 +3109,152 @@
           <a:chExt cx="0" cy="0"/>
         </a:xfrm>
       </p:grpSpPr>
-      <p:sp>
-        <p:nvSpPr>
-          <p:cNvPr id="2" name="Title 1"/>
-          <p:cNvSpPr>
-            <a:spLocks noGrp="1"/>
-          </p:cNvSpPr>
-          <p:nvPr>
-            <p:ph type="ctrTitle"/>
-          </p:nvPr>
-        </p:nvSpPr>
+      <p:pic>
+        <p:nvPicPr>
+          <p:cNvPr id="10" name="Picture 9">
+            <a:extLst>
+              <a:ext uri="{FF2B5EF4-FFF2-40B4-BE49-F238E27FC236}">
+                <a16:creationId xmlns:a16="http://schemas.microsoft.com/office/drawing/2014/main" id="{AB38826E-DFD4-1C4E-B492-C7EBE0740EA1}"/>
+              </a:ext>
+            </a:extLst>
+          </p:cNvPr>
+          <p:cNvPicPr>
+            <a:picLocks noChangeAspect="1"/>
+          </p:cNvPicPr>
+          <p:nvPr/>
+        </p:nvPicPr>
+        <p:blipFill>
+          <a:blip r:embed="rId2">
+            <a:alphaModFix amt="50000"/>
+          </a:blip>
+          <a:stretch>
+            <a:fillRect/>
+          </a:stretch>
+        </p:blipFill>
         <p:spPr>
           <a:xfrm>
-            <a:off x="685800" y="1597819"/>
-            <a:ext cx="7772400" cy="1102519"/>
+            <a:off x="0" y="0"/>
+            <a:ext cx="9144000" cy="5143500"/>
+          </a:xfrm>
+          <a:prstGeom prst="rect">
+            <a:avLst/>
+          </a:prstGeom>
+          <a:ln>
+            <a:noFill/>
+          </a:ln>
+          <a:effectLst>
+            <a:softEdge rad="112500"/>
+          </a:effectLst>
+        </p:spPr>
+      </p:pic>
+      <p:sp>
+        <p:nvSpPr>
+          <p:cNvPr id="2" name="Title 1"/>
+          <p:cNvSpPr>
+            <a:spLocks noGrp="1"/>
+          </p:cNvSpPr>
+          <p:nvPr>
+            <p:ph type="title"/>
+          </p:nvPr>
+        </p:nvSpPr>
+        <p:spPr/>
+        <p:txBody>
+          <a:bodyPr>
+            <a:normAutofit fontScale="90000"/>
+          </a:bodyPr>
+          <a:lstStyle/>
+          <a:p>
+            <a:pPr marL="0" lvl="0" indent="0">
+              <a:buNone/>
+            </a:pPr>
+            <a:r>
+              <a:t>Trend Analysis of Priest Lake Water Temperature Data</a:t>
+            </a:r>
+          </a:p>
+        </p:txBody>
+      </p:sp>
+      <p:sp>
+        <p:nvSpPr>
+          <p:cNvPr id="3" name="Subtitle 2"/>
+          <p:cNvSpPr>
+            <a:spLocks noGrp="1"/>
+          </p:cNvSpPr>
+          <p:nvPr>
+            <p:ph idx="1"/>
+          </p:nvPr>
+        </p:nvSpPr>
+        <p:spPr>
+          <a:xfrm>
+            <a:off x="3108960" y="1140823"/>
+            <a:ext cx="2917371" cy="1149532"/>
           </a:xfrm>
         </p:spPr>
         <p:txBody>
+          <a:bodyPr>
+            <a:normAutofit lnSpcReduction="10000"/>
+          </a:bodyPr>
+          <a:lstStyle/>
+          <a:p>
+            <a:pPr marL="0" lvl="0" indent="0" algn="ctr">
+              <a:buNone/>
+            </a:pPr>
+            <a:br>
+              <a:rPr dirty="0">
+                <a:solidFill>
+                  <a:schemeClr val="tx1"/>
+                </a:solidFill>
+              </a:rPr>
+            </a:br>
+            <a:br>
+              <a:rPr dirty="0">
+                <a:solidFill>
+                  <a:schemeClr val="tx1"/>
+                </a:solidFill>
+              </a:rPr>
+            </a:br>
+            <a:r>
+              <a:rPr dirty="0">
+                <a:solidFill>
+                  <a:schemeClr val="tx1"/>
+                </a:solidFill>
+              </a:rPr>
+              <a:t>Ephraim </a:t>
+            </a:r>
+            <a:r>
+              <a:rPr dirty="0" err="1">
+                <a:solidFill>
+                  <a:schemeClr val="tx1"/>
+                </a:solidFill>
+              </a:rPr>
+              <a:t>Romesberg</a:t>
+            </a:r>
+            <a:endParaRPr dirty="0">
+              <a:solidFill>
+                <a:schemeClr val="tx1"/>
+              </a:solidFill>
+            </a:endParaRPr>
+          </a:p>
+        </p:txBody>
+      </p:sp>
+      <p:sp>
+        <p:nvSpPr>
+          <p:cNvPr id="4" name="Date Placeholder 3"/>
+          <p:cNvSpPr>
+            <a:spLocks noGrp="1"/>
+          </p:cNvSpPr>
+          <p:nvPr>
+            <p:ph type="dt" sz="half" idx="10"/>
+          </p:nvPr>
+        </p:nvSpPr>
+        <p:spPr/>
+        <p:txBody>
           <a:bodyPr/>
           <a:lstStyle/>
           <a:p>
-            <a:pPr lvl="0" indent="0" marL="0">
+            <a:pPr marL="0" lvl="0" indent="0">
               <a:buNone/>
             </a:pPr>
             <a:r>
-              <a:rPr/>
-              <a:t>Trend Analysis of Priest Lake Water Temperature Data</a:t>
-            </a:r>
-          </a:p>
-        </p:txBody>
-      </p:sp>
-      <p:sp>
-        <p:nvSpPr>
-          <p:cNvPr id="3" name="Subtitle 2"/>
-          <p:cNvSpPr>
-            <a:spLocks noGrp="1"/>
-          </p:cNvSpPr>
-          <p:nvPr>
-            <p:ph idx="1" type="subTitle"/>
-          </p:nvPr>
-        </p:nvSpPr>
-        <p:spPr>
-          <a:xfrm>
-            <a:off x="1371600" y="2914650"/>
-            <a:ext cx="6400800" cy="1314450"/>
-          </a:xfrm>
-        </p:spPr>
-        <p:txBody>
-          <a:bodyPr/>
-          <a:lstStyle/>
-          <a:p>
-            <a:pPr lvl="0" indent="0" marL="0">
-              <a:buNone/>
-            </a:pPr>
-            <a:br/>
-            <a:br/>
-            <a:r>
-              <a:rPr/>
-              <a:t>Ephraim Romesberg</a:t>
-            </a:r>
-          </a:p>
-        </p:txBody>
-      </p:sp>
-      <p:sp>
-        <p:nvSpPr>
-          <p:cNvPr id="4" name="Date Placeholder 3"/>
-          <p:cNvSpPr>
-            <a:spLocks noGrp="1"/>
-          </p:cNvSpPr>
-          <p:nvPr>
-            <p:ph idx="10" sz="half" type="dt"/>
-          </p:nvPr>
-        </p:nvSpPr>
-        <p:spPr/>
-        <p:txBody>
-          <a:bodyPr/>
-          <a:lstStyle/>
-          <a:p>
-            <a:pPr lvl="0" indent="0" marL="0">
-              <a:buNone/>
-            </a:pPr>
-            <a:r>
-              <a:rPr/>
               <a:t>2024-12-31</a:t>
             </a:r>
           </a:p>
@@ -3183,10 +3262,13 @@
       </p:sp>
     </p:spTree>
   </p:cSld>
+  <p:clrMapOvr>
+    <a:masterClrMapping/>
+  </p:clrMapOvr>
 </p:sld>
 </file>
 
-<file path=ppt/slides/slide2.xml><?xml version="1.0" encoding="utf-8"?>
+<file path=ppt/slides/slide10.xml><?xml version="1.0" encoding="utf-8"?>
 <p:sld xmlns:a="http://schemas.openxmlformats.org/drawingml/2006/main" xmlns:r="http://schemas.openxmlformats.org/officeDocument/2006/relationships" xmlns:p="http://schemas.openxmlformats.org/presentationml/2006/main">
   <p:cSld>
     <p:spTree>
@@ -3215,15 +3297,17 @@
         </p:nvSpPr>
         <p:spPr/>
         <p:txBody>
-          <a:bodyPr/>
-          <a:lstStyle/>
-          <a:p>
-            <a:pPr lvl="0" indent="0" marL="0">
+          <a:bodyPr>
+            <a:noAutofit/>
+          </a:bodyPr>
+          <a:lstStyle/>
+          <a:p>
+            <a:pPr marL="0" lvl="0" indent="0">
               <a:buNone/>
             </a:pPr>
             <a:r>
-              <a:rPr/>
-              <a:t>R Markdown</a:t>
+              <a:rPr dirty="0"/>
+              <a:t>Dealing with Spatial and Temporal Dependence:</a:t>
             </a:r>
           </a:p>
         </p:txBody>
@@ -3240,52 +3324,77 @@
         </p:nvSpPr>
         <p:spPr/>
         <p:txBody>
-          <a:bodyPr/>
-          <a:lstStyle/>
-          <a:p>
-            <a:pPr lvl="0" indent="0" marL="0">
+          <a:bodyPr>
+            <a:normAutofit/>
+          </a:bodyPr>
+          <a:lstStyle/>
+          <a:p>
+            <a:r>
+              <a:rPr sz="1600" dirty="0"/>
+              <a:t>R-S Kendall test still assumes that the observations are independent </a:t>
+            </a:r>
+            <a:endParaRPr lang="en-US" sz="1600" dirty="0"/>
+          </a:p>
+          <a:p>
+            <a:r>
+              <a:rPr sz="1600" dirty="0"/>
+              <a:t>Using a test on correlated observations that assumes independence will often lead to misleading results </a:t>
+            </a:r>
+            <a:endParaRPr lang="en-US" sz="1600" dirty="0"/>
+          </a:p>
+          <a:p>
+            <a:r>
+              <a:rPr sz="1600" dirty="0"/>
+              <a:t>A correlated sample provides less information than an independent sample </a:t>
+            </a:r>
+            <a:endParaRPr lang="en-US" sz="1600" dirty="0"/>
+          </a:p>
+          <a:p>
+            <a:r>
+              <a:rPr sz="1600" dirty="0"/>
+              <a:t>We need to adjust for this loss of information when performing our hypothesis test</a:t>
+            </a:r>
+          </a:p>
+          <a:p>
+            <a:pPr marL="0" indent="0">
               <a:buNone/>
             </a:pPr>
             <a:r>
-              <a:rPr/>
-              <a:t>This is an R Markdown presentation. Markdown is a simple formatting syntax for authoring HTML, PDF, and MS Word documents. For more details on using R Markdown see </a:t>
-            </a:r>
-            <a:r>
-              <a:rPr>
-                <a:hlinkClick r:id="rId2"/>
-              </a:rPr>
-              <a:t>http://rmarkdown.rstudio.com</a:t>
-            </a:r>
-            <a:r>
-              <a:rPr/>
-              <a:t>.</a:t>
-            </a:r>
-          </a:p>
-          <a:p>
-            <a:pPr lvl="0" indent="0" marL="0">
-              <a:buNone/>
-            </a:pPr>
-            <a:r>
-              <a:rPr/>
-              <a:t>When you click the </a:t>
-            </a:r>
-            <a:r>
-              <a:rPr b="1"/>
-              <a:t>Knit</a:t>
-            </a:r>
-            <a:r>
-              <a:rPr/>
-              <a:t> button a document will be generated that includes both content as well as the output of any embedded R code chunks within the document.</a:t>
+              <a:rPr lang="en-US" sz="1600" dirty="0"/>
+              <a:t>Dependent Sample=Less Information</a:t>
+            </a:r>
+          </a:p>
+          <a:p>
+            <a:r>
+              <a:rPr sz="1600" dirty="0"/>
+              <a:t>There is a version of the Seasonal Kendall test that is adjusted for serial dependence over time </a:t>
+            </a:r>
+            <a:endParaRPr lang="en-US" sz="1600" dirty="0"/>
+          </a:p>
+          <a:p>
+            <a:r>
+              <a:rPr sz="1600" dirty="0"/>
+              <a:t>For technical details see Hirsch and Slack (1984) </a:t>
+            </a:r>
+            <a:endParaRPr lang="en-US" sz="1600" dirty="0"/>
+          </a:p>
+          <a:p>
+            <a:r>
+              <a:rPr sz="1600" dirty="0"/>
+              <a:t>This test is easily extended to also account for spatial dependence in regional data</a:t>
             </a:r>
           </a:p>
         </p:txBody>
       </p:sp>
     </p:spTree>
   </p:cSld>
+  <p:clrMapOvr>
+    <a:masterClrMapping/>
+  </p:clrMapOvr>
 </p:sld>
 </file>
 
-<file path=ppt/slides/slide3.xml><?xml version="1.0" encoding="utf-8"?>
+<file path=ppt/slides/slide11.xml><?xml version="1.0" encoding="utf-8"?>
 <p:sld xmlns:a="http://schemas.openxmlformats.org/drawingml/2006/main" xmlns:r="http://schemas.openxmlformats.org/officeDocument/2006/relationships" xmlns:p="http://schemas.openxmlformats.org/presentationml/2006/main">
   <p:cSld>
     <p:spTree>
@@ -3317,12 +3426,11 @@
           <a:bodyPr/>
           <a:lstStyle/>
           <a:p>
-            <a:pPr lvl="0" indent="0" marL="0">
+            <a:pPr marL="0" lvl="0" indent="0">
               <a:buNone/>
             </a:pPr>
             <a:r>
-              <a:rPr/>
-              <a:t>Slide with Bullets</a:t>
+              <a:t>Which test is best for our data?</a:t>
             </a:r>
           </a:p>
         </p:txBody>
@@ -3339,37 +3447,55 @@
         </p:nvSpPr>
         <p:spPr/>
         <p:txBody>
-          <a:bodyPr/>
-          <a:lstStyle/>
-          <a:p>
-            <a:pPr lvl="0"/>
-            <a:r>
-              <a:rPr/>
-              <a:t>Bullet 1</a:t>
-            </a:r>
-          </a:p>
-          <a:p>
-            <a:pPr lvl="0"/>
-            <a:r>
-              <a:rPr/>
-              <a:t>Bullet 2</a:t>
-            </a:r>
-          </a:p>
-          <a:p>
-            <a:pPr lvl="0"/>
-            <a:r>
-              <a:rPr/>
-              <a:t>Bullet 3</a:t>
+          <a:bodyPr>
+            <a:normAutofit/>
+          </a:bodyPr>
+          <a:lstStyle/>
+          <a:p>
+            <a:r>
+              <a:rPr sz="1600" dirty="0"/>
+              <a:t>We have no reason to assume our data is normal or that if there is a trend it is linear </a:t>
+            </a:r>
+            <a:endParaRPr lang="en-US" sz="1600" dirty="0"/>
+          </a:p>
+          <a:p>
+            <a:r>
+              <a:rPr sz="1600" dirty="0"/>
+              <a:t>Our data is from multiple seasons (June, July, August, and September) and Regions (KALI, PLNO, and PLSO) </a:t>
+            </a:r>
+            <a:endParaRPr lang="en-US" sz="1600" dirty="0"/>
+          </a:p>
+          <a:p>
+            <a:r>
+              <a:rPr sz="1600" dirty="0"/>
+              <a:t>More than likely there is spatial and temporal dependence between observations</a:t>
+            </a:r>
+          </a:p>
+          <a:p>
+            <a:r>
+              <a:rPr sz="1600" dirty="0"/>
+              <a:t>This makes a Regional-Seasonal Kendall test adjusted for Spatiotemporal dependence a better choice than a more conventional method such </a:t>
+            </a:r>
+            <a:r>
+              <a:rPr lang="en-US" sz="1600" dirty="0"/>
+              <a:t>a</a:t>
+            </a:r>
+            <a:r>
+              <a:rPr sz="1600" dirty="0"/>
+              <a:t>s linear regression</a:t>
             </a:r>
           </a:p>
         </p:txBody>
       </p:sp>
     </p:spTree>
   </p:cSld>
+  <p:clrMapOvr>
+    <a:masterClrMapping/>
+  </p:clrMapOvr>
 </p:sld>
 </file>
 
-<file path=ppt/slides/slide4.xml><?xml version="1.0" encoding="utf-8"?>
+<file path=ppt/slides/slide12.xml><?xml version="1.0" encoding="utf-8"?>
 <p:sld xmlns:a="http://schemas.openxmlformats.org/drawingml/2006/main" xmlns:r="http://schemas.openxmlformats.org/officeDocument/2006/relationships" xmlns:p="http://schemas.openxmlformats.org/presentationml/2006/main">
   <p:cSld>
     <p:spTree>
@@ -3401,12 +3527,28 @@
           <a:bodyPr/>
           <a:lstStyle/>
           <a:p>
-            <a:pPr lvl="0" indent="0" marL="0">
+            <a:pPr marL="0" lvl="0" indent="0">
               <a:buNone/>
             </a:pPr>
             <a:r>
-              <a:rPr/>
-              <a:t>Slide with R Output</a:t>
+              <a:rPr dirty="0"/>
+              <a:t>R</a:t>
+            </a:r>
+            <a:r>
+              <a:rPr lang="en-US" dirty="0"/>
+              <a:t>egional</a:t>
+            </a:r>
+            <a:r>
+              <a:rPr dirty="0"/>
+              <a:t>-S</a:t>
+            </a:r>
+            <a:r>
+              <a:rPr lang="en-US" dirty="0"/>
+              <a:t>easonal</a:t>
+            </a:r>
+            <a:r>
+              <a:rPr dirty="0"/>
+              <a:t> Test Results:</a:t>
             </a:r>
           </a:p>
         </p:txBody>
@@ -3423,53 +3565,96 @@
         </p:nvSpPr>
         <p:spPr/>
         <p:txBody>
-          <a:bodyPr/>
-          <a:lstStyle/>
-          <a:p>
-            <a:pPr lvl="0" indent="0">
-              <a:buNone/>
-            </a:pPr>
-            <a:r>
-              <a:rPr>
-                <a:solidFill>
-                  <a:srgbClr val="06287E"/>
-                </a:solidFill>
+          <a:bodyPr>
+            <a:normAutofit/>
+          </a:bodyPr>
+          <a:lstStyle/>
+          <a:p>
+            <a:r>
+              <a:rPr sz="1600" dirty="0"/>
+              <a:t>R-S Kendall test adjusted for Spatiotemporal dependence was performed using </a:t>
+            </a:r>
+            <a:r>
+              <a:rPr sz="1600" dirty="0" err="1">
                 <a:latin typeface="Courier"/>
               </a:rPr>
-              <a:t>summary</a:t>
-            </a:r>
-            <a:r>
-              <a:rPr>
+              <a:t>rkt</a:t>
+            </a:r>
+            <a:r>
+              <a:rPr sz="1600" dirty="0"/>
+              <a:t> package in R </a:t>
+            </a:r>
+            <a:endParaRPr lang="en-US" sz="1600" dirty="0"/>
+          </a:p>
+          <a:p>
+            <a:r>
+              <a:rPr sz="1600" dirty="0"/>
+              <a:t>Here regions are sites (KALI, PLNO, and PLSO) and seasons are months (June, July, August, and September) </a:t>
+            </a:r>
+            <a:endParaRPr lang="en-US" sz="1600" dirty="0"/>
+          </a:p>
+          <a:p>
+            <a:r>
+              <a:rPr sz="1600" dirty="0"/>
+              <a:t>Based on this test we got a Tau value of approximately </a:t>
+            </a:r>
+            <a:r>
+              <a:rPr sz="1600" dirty="0">
                 <a:latin typeface="Courier"/>
               </a:rPr>
-              <a:t>(cars)</a:t>
-            </a:r>
-          </a:p>
-          <a:p>
-            <a:pPr lvl="0" indent="0">
-              <a:buNone/>
-            </a:pPr>
-            <a:r>
-              <a:rPr>
+              <a:t>.27</a:t>
+            </a:r>
+            <a:r>
+              <a:rPr sz="1600" dirty="0"/>
+              <a:t> and p-value of approximately </a:t>
+            </a:r>
+            <a:r>
+              <a:rPr sz="1600" dirty="0">
                 <a:latin typeface="Courier"/>
               </a:rPr>
-              <a:t>##      speed           dist       
-##  Min.   : 4.0   Min.   :  2.00  
-##  1st Qu.:12.0   1st Qu.: 26.00  
-##  Median :15.0   Median : 36.00  
-##  Mean   :15.4   Mean   : 42.98  
-##  3rd Qu.:19.0   3rd Qu.: 56.00  
-##  Max.   :25.0   Max.   :120.00</a:t>
+              <a:t>0.005</a:t>
+            </a:r>
+            <a:r>
+              <a:rPr sz="1600" dirty="0"/>
+              <a:t> </a:t>
+            </a:r>
+            <a:endParaRPr lang="en-US" sz="1600" dirty="0"/>
+          </a:p>
+          <a:p>
+            <a:r>
+              <a:rPr sz="1600" dirty="0"/>
+              <a:t>Using a standard significance level of </a:t>
+            </a:r>
+            <a:r>
+              <a:rPr sz="1600" dirty="0">
+                <a:latin typeface="Courier"/>
+              </a:rPr>
+              <a:t>.05</a:t>
+            </a:r>
+            <a:r>
+              <a:rPr sz="1600" dirty="0"/>
+              <a:t> we reject the null hypothesis and conclude that there is an increasing trend</a:t>
+            </a:r>
+            <a:r>
+              <a:rPr lang="en-US" sz="1600" dirty="0"/>
+              <a:t>;</a:t>
+            </a:r>
+            <a:r>
+              <a:rPr sz="1600" dirty="0"/>
+              <a:t> later observations are likely to be larger than earlier ones</a:t>
             </a:r>
           </a:p>
         </p:txBody>
       </p:sp>
     </p:spTree>
   </p:cSld>
+  <p:clrMapOvr>
+    <a:masterClrMapping/>
+  </p:clrMapOvr>
 </p:sld>
 </file>
 
-<file path=ppt/slides/slide5.xml><?xml version="1.0" encoding="utf-8"?>
+<file path=ppt/slides/slide13.xml><?xml version="1.0" encoding="utf-8"?>
 <p:sld xmlns:a="http://schemas.openxmlformats.org/drawingml/2006/main" xmlns:r="http://schemas.openxmlformats.org/officeDocument/2006/relationships" xmlns:p="http://schemas.openxmlformats.org/presentationml/2006/main">
   <p:cSld>
     <p:spTree>
@@ -3501,19 +3686,426 @@
           <a:bodyPr/>
           <a:lstStyle/>
           <a:p>
-            <a:pPr lvl="0" indent="0" marL="0">
+            <a:pPr marL="0" lvl="0" indent="0">
               <a:buNone/>
             </a:pPr>
             <a:r>
-              <a:rPr/>
-              <a:t>Slide with Plot</a:t>
+              <a:rPr dirty="0"/>
+              <a:t>Trend Within Seasons:</a:t>
+            </a:r>
+          </a:p>
+        </p:txBody>
+      </p:sp>
+      <p:sp>
+        <p:nvSpPr>
+          <p:cNvPr id="3" name="Content Placeholder 2"/>
+          <p:cNvSpPr>
+            <a:spLocks noGrp="1"/>
+          </p:cNvSpPr>
+          <p:nvPr>
+            <p:ph idx="1"/>
+          </p:nvPr>
+        </p:nvSpPr>
+        <p:spPr/>
+        <p:txBody>
+          <a:bodyPr>
+            <a:normAutofit/>
+          </a:bodyPr>
+          <a:lstStyle/>
+          <a:p>
+            <a:r>
+              <a:rPr sz="1600" dirty="0"/>
+              <a:t>The R-S Kendall test tells us that there is a trend in at least some of the region-season combinations </a:t>
+            </a:r>
+            <a:endParaRPr lang="en-US" sz="1600" dirty="0"/>
+          </a:p>
+          <a:p>
+            <a:r>
+              <a:rPr sz="1600" dirty="0"/>
+              <a:t>It does not tell us which specific regions and seasons have a trend </a:t>
+            </a:r>
+            <a:endParaRPr lang="en-US" sz="1600" dirty="0"/>
+          </a:p>
+          <a:p>
+            <a:r>
+              <a:rPr sz="1600" dirty="0"/>
+              <a:t>It seems plausible that warmer months could have more of a trend than cooler months </a:t>
+            </a:r>
+            <a:endParaRPr lang="en-US" sz="1600" dirty="0"/>
+          </a:p>
+          <a:p>
+            <a:r>
+              <a:rPr sz="1600" dirty="0"/>
+              <a:t>We can investigate this further by running individual Regional Kendall tests for data from each month</a:t>
+            </a:r>
+          </a:p>
+          <a:p>
+            <a:pPr marL="0" indent="0">
+              <a:buNone/>
+            </a:pPr>
+            <a:r>
+              <a:rPr sz="1600" dirty="0"/>
+              <a:t>Results From By-Month tests:</a:t>
+            </a:r>
+          </a:p>
+          <a:p>
+            <a:r>
+              <a:rPr sz="1600" dirty="0"/>
+              <a:t>Greatest trend is in July (Tau value of </a:t>
+            </a:r>
+            <a:r>
+              <a:rPr sz="1600" dirty="0">
+                <a:latin typeface="Courier"/>
+              </a:rPr>
+              <a:t>0.49</a:t>
+            </a:r>
+            <a:r>
+              <a:rPr sz="1600" dirty="0"/>
+              <a:t> and p-value of </a:t>
+            </a:r>
+            <a:r>
+              <a:rPr sz="1600" dirty="0">
+                <a:latin typeface="Courier"/>
+              </a:rPr>
+              <a:t>0.002</a:t>
+            </a:r>
+            <a:r>
+              <a:rPr sz="1600" dirty="0"/>
+              <a:t>) </a:t>
+            </a:r>
+            <a:endParaRPr lang="en-US" sz="1600" dirty="0"/>
+          </a:p>
+          <a:p>
+            <a:r>
+              <a:rPr sz="1600" dirty="0"/>
+              <a:t>Weakly significant positive trends in June and August </a:t>
+            </a:r>
+            <a:endParaRPr lang="en-US" sz="1600" dirty="0"/>
+          </a:p>
+          <a:p>
+            <a:r>
+              <a:rPr sz="1600" dirty="0"/>
+              <a:t>No significant trend in September</a:t>
+            </a:r>
+          </a:p>
+        </p:txBody>
+      </p:sp>
+    </p:spTree>
+  </p:cSld>
+  <p:clrMapOvr>
+    <a:masterClrMapping/>
+  </p:clrMapOvr>
+</p:sld>
+</file>
+
+<file path=ppt/slides/slide14.xml><?xml version="1.0" encoding="utf-8"?>
+<p:sld xmlns:a="http://schemas.openxmlformats.org/drawingml/2006/main" xmlns:r="http://schemas.openxmlformats.org/officeDocument/2006/relationships" xmlns:p="http://schemas.openxmlformats.org/presentationml/2006/main">
+  <p:cSld>
+    <p:spTree>
+      <p:nvGrpSpPr>
+        <p:cNvPr id="1" name=""/>
+        <p:cNvGrpSpPr/>
+        <p:nvPr/>
+      </p:nvGrpSpPr>
+      <p:grpSpPr>
+        <a:xfrm>
+          <a:off x="0" y="0"/>
+          <a:ext cx="0" cy="0"/>
+          <a:chOff x="0" y="0"/>
+          <a:chExt cx="0" cy="0"/>
+        </a:xfrm>
+      </p:grpSpPr>
+      <p:sp>
+        <p:nvSpPr>
+          <p:cNvPr id="2" name="Title 1"/>
+          <p:cNvSpPr>
+            <a:spLocks noGrp="1"/>
+          </p:cNvSpPr>
+          <p:nvPr>
+            <p:ph type="title"/>
+          </p:nvPr>
+        </p:nvSpPr>
+        <p:spPr/>
+        <p:txBody>
+          <a:bodyPr/>
+          <a:lstStyle/>
+          <a:p>
+            <a:pPr marL="0" lvl="0" indent="0">
+              <a:buNone/>
+            </a:pPr>
+            <a:r>
+              <a:rPr dirty="0"/>
+              <a:t>Quantifying the Trend:</a:t>
+            </a:r>
+          </a:p>
+        </p:txBody>
+      </p:sp>
+      <p:sp>
+        <p:nvSpPr>
+          <p:cNvPr id="3" name="Content Placeholder 2"/>
+          <p:cNvSpPr>
+            <a:spLocks noGrp="1"/>
+          </p:cNvSpPr>
+          <p:nvPr>
+            <p:ph idx="1"/>
+          </p:nvPr>
+        </p:nvSpPr>
+        <p:spPr/>
+        <p:txBody>
+          <a:bodyPr>
+            <a:normAutofit/>
+          </a:bodyPr>
+          <a:lstStyle/>
+          <a:p>
+            <a:r>
+              <a:rPr sz="1600" dirty="0"/>
+              <a:t>A positive Kendall’s Tau tells us that observations are more likely to increase over time </a:t>
+            </a:r>
+            <a:endParaRPr lang="en-US" sz="1600" dirty="0"/>
+          </a:p>
+          <a:p>
+            <a:r>
+              <a:rPr sz="1600" dirty="0"/>
+              <a:t>It does not tell us how much they increase (i.e. °C/Year) </a:t>
+            </a:r>
+            <a:endParaRPr lang="en-US" sz="1600" dirty="0"/>
+          </a:p>
+          <a:p>
+            <a:r>
+              <a:rPr sz="1600" dirty="0"/>
+              <a:t>To estimate the magnitude of the trend we have another statistic known as the Theil-Sen’s slope </a:t>
+            </a:r>
+            <a:endParaRPr lang="en-US" sz="1600" dirty="0"/>
+          </a:p>
+          <a:p>
+            <a:r>
+              <a:rPr sz="1600" dirty="0"/>
+              <a:t>Theil-Sen’s slope also uses pairs of successive observations </a:t>
+            </a:r>
+            <a:endParaRPr lang="en-US" sz="1600" dirty="0"/>
+          </a:p>
+          <a:p>
+            <a:r>
+              <a:rPr sz="1600" dirty="0"/>
+              <a:t>To calculate Theil-Sen’s slope we calculate the slope of the line connecting each pair of observations,</a:t>
+            </a:r>
+            <a:r>
+              <a:rPr lang="en-US" sz="1600" dirty="0"/>
+              <a:t> </a:t>
+            </a:r>
+            <a:r>
+              <a:rPr sz="1600" dirty="0"/>
+              <a:t>we then take the median of these slopes </a:t>
+            </a:r>
+            <a:endParaRPr lang="en-US" sz="1600" dirty="0"/>
+          </a:p>
+          <a:p>
+            <a:r>
+              <a:rPr sz="1600" dirty="0"/>
+              <a:t>This approach can be adjusted for regional/seasonal data just as with Kendall’s Tau </a:t>
+            </a:r>
+            <a:endParaRPr lang="en-US" sz="1600" dirty="0"/>
+          </a:p>
+          <a:p>
+            <a:r>
+              <a:rPr sz="1600" dirty="0"/>
+              <a:t>Theil-Sen slope does not assume normality and is much less sensitive to outliers than ordinary regression slope </a:t>
+            </a:r>
+            <a:endParaRPr lang="en-US" sz="1600" dirty="0"/>
+          </a:p>
+          <a:p>
+            <a:r>
+              <a:rPr sz="1600" dirty="0"/>
+              <a:t>It does however assume the trend is linear, so interpret with caution</a:t>
+            </a:r>
+          </a:p>
+        </p:txBody>
+      </p:sp>
+    </p:spTree>
+  </p:cSld>
+  <p:clrMapOvr>
+    <a:masterClrMapping/>
+  </p:clrMapOvr>
+</p:sld>
+</file>
+
+<file path=ppt/slides/slide15.xml><?xml version="1.0" encoding="utf-8"?>
+<p:sld xmlns:a="http://schemas.openxmlformats.org/drawingml/2006/main" xmlns:r="http://schemas.openxmlformats.org/officeDocument/2006/relationships" xmlns:p="http://schemas.openxmlformats.org/presentationml/2006/main">
+  <p:cSld>
+    <p:spTree>
+      <p:nvGrpSpPr>
+        <p:cNvPr id="1" name=""/>
+        <p:cNvGrpSpPr/>
+        <p:nvPr/>
+      </p:nvGrpSpPr>
+      <p:grpSpPr>
+        <a:xfrm>
+          <a:off x="0" y="0"/>
+          <a:ext cx="0" cy="0"/>
+          <a:chOff x="0" y="0"/>
+          <a:chExt cx="0" cy="0"/>
+        </a:xfrm>
+      </p:grpSpPr>
+      <p:sp>
+        <p:nvSpPr>
+          <p:cNvPr id="2" name="Title 1"/>
+          <p:cNvSpPr>
+            <a:spLocks noGrp="1"/>
+          </p:cNvSpPr>
+          <p:nvPr>
+            <p:ph type="title"/>
+          </p:nvPr>
+        </p:nvSpPr>
+        <p:spPr/>
+        <p:txBody>
+          <a:bodyPr/>
+          <a:lstStyle/>
+          <a:p>
+            <a:pPr marL="0" lvl="0" indent="0">
+              <a:buNone/>
+            </a:pPr>
+            <a:r>
+              <a:rPr dirty="0"/>
+              <a:t>Theil-Sen Slopes:</a:t>
+            </a:r>
+          </a:p>
+        </p:txBody>
+      </p:sp>
+      <p:sp>
+        <p:nvSpPr>
+          <p:cNvPr id="3" name="Content Placeholder 2"/>
+          <p:cNvSpPr>
+            <a:spLocks noGrp="1"/>
+          </p:cNvSpPr>
+          <p:nvPr>
+            <p:ph idx="1"/>
+          </p:nvPr>
+        </p:nvSpPr>
+        <p:spPr/>
+        <p:txBody>
+          <a:bodyPr>
+            <a:normAutofit/>
+          </a:bodyPr>
+          <a:lstStyle/>
+          <a:p>
+            <a:r>
+              <a:rPr sz="1600" dirty="0"/>
+              <a:t>The Regional-Seasonal Theil-Sen Slope is approximately </a:t>
+            </a:r>
+            <a:r>
+              <a:rPr sz="1600" dirty="0">
+                <a:latin typeface="Courier"/>
+              </a:rPr>
+              <a:t>.08</a:t>
+            </a:r>
+            <a:r>
+              <a:rPr sz="1600" dirty="0"/>
+              <a:t> </a:t>
+            </a:r>
+            <a:endParaRPr lang="en-US" sz="1600" dirty="0"/>
+          </a:p>
+          <a:p>
+            <a:r>
+              <a:rPr lang="en-US" sz="1600" dirty="0"/>
+              <a:t>As </a:t>
+            </a:r>
+            <a:r>
+              <a:rPr sz="1600" dirty="0"/>
+              <a:t>a </a:t>
+            </a:r>
+            <a:r>
+              <a:rPr lang="en-US" sz="1600" dirty="0"/>
+              <a:t>(</a:t>
+            </a:r>
+            <a:r>
+              <a:rPr sz="1600" dirty="0"/>
+              <a:t>very rough</a:t>
+            </a:r>
+            <a:r>
+              <a:rPr lang="en-US" sz="1600" dirty="0"/>
+              <a:t>)</a:t>
+            </a:r>
+            <a:r>
+              <a:rPr sz="1600" dirty="0"/>
+              <a:t> approximation</a:t>
+            </a:r>
+            <a:r>
+              <a:rPr lang="en-US" sz="1600" dirty="0"/>
+              <a:t> </a:t>
+            </a:r>
+            <a:r>
+              <a:rPr sz="1600" dirty="0"/>
+              <a:t>we can say that Temperature is increasing at about .08 °C/Year </a:t>
+            </a:r>
+            <a:endParaRPr lang="en-US" sz="1600" dirty="0"/>
+          </a:p>
+          <a:p>
+            <a:r>
+              <a:rPr sz="1600" dirty="0"/>
+              <a:t>Since some months have a more significant trend than others it is better to look at the slopes by month </a:t>
+            </a:r>
+            <a:endParaRPr lang="en-US" sz="1600" dirty="0"/>
+          </a:p>
+          <a:p>
+            <a:r>
+              <a:rPr sz="1600" dirty="0"/>
+              <a:t>We get the largest slope in July at approximately 0.14 °C/Year</a:t>
+            </a:r>
+          </a:p>
+        </p:txBody>
+      </p:sp>
+    </p:spTree>
+  </p:cSld>
+  <p:clrMapOvr>
+    <a:masterClrMapping/>
+  </p:clrMapOvr>
+</p:sld>
+</file>
+
+<file path=ppt/slides/slide16.xml><?xml version="1.0" encoding="utf-8"?>
+<p:sld xmlns:a="http://schemas.openxmlformats.org/drawingml/2006/main" xmlns:r="http://schemas.openxmlformats.org/officeDocument/2006/relationships" xmlns:p="http://schemas.openxmlformats.org/presentationml/2006/main">
+  <p:cSld>
+    <p:spTree>
+      <p:nvGrpSpPr>
+        <p:cNvPr id="1" name=""/>
+        <p:cNvGrpSpPr/>
+        <p:nvPr/>
+      </p:nvGrpSpPr>
+      <p:grpSpPr>
+        <a:xfrm>
+          <a:off x="0" y="0"/>
+          <a:ext cx="0" cy="0"/>
+          <a:chOff x="0" y="0"/>
+          <a:chExt cx="0" cy="0"/>
+        </a:xfrm>
+      </p:grpSpPr>
+      <p:sp>
+        <p:nvSpPr>
+          <p:cNvPr id="2" name="Title 1"/>
+          <p:cNvSpPr>
+            <a:spLocks noGrp="1"/>
+          </p:cNvSpPr>
+          <p:nvPr>
+            <p:ph type="title"/>
+          </p:nvPr>
+        </p:nvSpPr>
+        <p:spPr/>
+        <p:txBody>
+          <a:bodyPr/>
+          <a:lstStyle/>
+          <a:p>
+            <a:pPr marL="0" lvl="0" indent="0">
+              <a:buNone/>
+            </a:pPr>
+            <a:r>
+              <a:t>Confidence Intervals for Tau:</a:t>
             </a:r>
           </a:p>
         </p:txBody>
       </p:sp>
       <p:pic>
         <p:nvPicPr>
-          <p:cNvPr descr="Trend-Analysis-of-Priest-Lake-Water-Temperature-Data_files/figure-pptx/pressure-1.png" id="0" name="Picture 1"/>
+          <p:cNvPr id="3" name="Picture 1" descr="Trend-Analysis-of-Priest-Lake-Water-Temperature-Data_files/figure-pptx/unnamed-chunk-3-1.png"/>
           <p:cNvPicPr>
             <a:picLocks noGrp="1" noChangeAspect="1"/>
           </p:cNvPicPr>
@@ -3543,6 +4135,2308 @@
       </p:pic>
     </p:spTree>
   </p:cSld>
+  <p:clrMapOvr>
+    <a:masterClrMapping/>
+  </p:clrMapOvr>
+</p:sld>
+</file>
+
+<file path=ppt/slides/slide17.xml><?xml version="1.0" encoding="utf-8"?>
+<p:sld xmlns:a="http://schemas.openxmlformats.org/drawingml/2006/main" xmlns:r="http://schemas.openxmlformats.org/officeDocument/2006/relationships" xmlns:p="http://schemas.openxmlformats.org/presentationml/2006/main">
+  <p:cSld>
+    <p:spTree>
+      <p:nvGrpSpPr>
+        <p:cNvPr id="1" name=""/>
+        <p:cNvGrpSpPr/>
+        <p:nvPr/>
+      </p:nvGrpSpPr>
+      <p:grpSpPr>
+        <a:xfrm>
+          <a:off x="0" y="0"/>
+          <a:ext cx="0" cy="0"/>
+          <a:chOff x="0" y="0"/>
+          <a:chExt cx="0" cy="0"/>
+        </a:xfrm>
+      </p:grpSpPr>
+      <p:sp>
+        <p:nvSpPr>
+          <p:cNvPr id="2" name="Title 1"/>
+          <p:cNvSpPr>
+            <a:spLocks noGrp="1"/>
+          </p:cNvSpPr>
+          <p:nvPr>
+            <p:ph type="title"/>
+          </p:nvPr>
+        </p:nvSpPr>
+        <p:spPr/>
+        <p:txBody>
+          <a:bodyPr/>
+          <a:lstStyle/>
+          <a:p>
+            <a:pPr marL="0" lvl="0" indent="0">
+              <a:buNone/>
+            </a:pPr>
+            <a:r>
+              <a:t>Confidence Intervals for Theil-Sen’s Slope:</a:t>
+            </a:r>
+          </a:p>
+        </p:txBody>
+      </p:sp>
+      <p:pic>
+        <p:nvPicPr>
+          <p:cNvPr id="3" name="Picture 1" descr="Trend-Analysis-of-Priest-Lake-Water-Temperature-Data_files/figure-pptx/unnamed-chunk-4-1.png"/>
+          <p:cNvPicPr>
+            <a:picLocks noGrp="1" noChangeAspect="1"/>
+          </p:cNvPicPr>
+          <p:nvPr/>
+        </p:nvPicPr>
+        <p:blipFill>
+          <a:blip r:embed="rId2"/>
+          <a:stretch>
+            <a:fillRect/>
+          </a:stretch>
+        </p:blipFill>
+        <p:spPr bwMode="auto">
+          <a:xfrm>
+            <a:off x="2451100" y="1193800"/>
+            <a:ext cx="4241800" cy="3390900"/>
+          </a:xfrm>
+          <a:prstGeom prst="rect">
+            <a:avLst/>
+          </a:prstGeom>
+          <a:noFill/>
+          <a:ln w="9525">
+            <a:noFill/>
+            <a:headEnd/>
+            <a:tailEnd/>
+          </a:ln>
+        </p:spPr>
+      </p:pic>
+    </p:spTree>
+  </p:cSld>
+  <p:clrMapOvr>
+    <a:masterClrMapping/>
+  </p:clrMapOvr>
+</p:sld>
+</file>
+
+<file path=ppt/slides/slide18.xml><?xml version="1.0" encoding="utf-8"?>
+<p:sld xmlns:a="http://schemas.openxmlformats.org/drawingml/2006/main" xmlns:r="http://schemas.openxmlformats.org/officeDocument/2006/relationships" xmlns:p="http://schemas.openxmlformats.org/presentationml/2006/main">
+  <p:cSld>
+    <p:spTree>
+      <p:nvGrpSpPr>
+        <p:cNvPr id="1" name=""/>
+        <p:cNvGrpSpPr/>
+        <p:nvPr/>
+      </p:nvGrpSpPr>
+      <p:grpSpPr>
+        <a:xfrm>
+          <a:off x="0" y="0"/>
+          <a:ext cx="0" cy="0"/>
+          <a:chOff x="0" y="0"/>
+          <a:chExt cx="0" cy="0"/>
+        </a:xfrm>
+      </p:grpSpPr>
+      <p:sp>
+        <p:nvSpPr>
+          <p:cNvPr id="2" name="Title 1"/>
+          <p:cNvSpPr>
+            <a:spLocks noGrp="1"/>
+          </p:cNvSpPr>
+          <p:nvPr>
+            <p:ph type="title"/>
+          </p:nvPr>
+        </p:nvSpPr>
+        <p:spPr/>
+        <p:txBody>
+          <a:bodyPr/>
+          <a:lstStyle/>
+          <a:p>
+            <a:pPr marL="0" lvl="0" indent="0">
+              <a:buNone/>
+            </a:pPr>
+            <a:r>
+              <a:rPr dirty="0"/>
+              <a:t>Interpreting the Confidence Intervals:</a:t>
+            </a:r>
+          </a:p>
+        </p:txBody>
+      </p:sp>
+      <p:sp>
+        <p:nvSpPr>
+          <p:cNvPr id="3" name="Content Placeholder 2"/>
+          <p:cNvSpPr>
+            <a:spLocks noGrp="1"/>
+          </p:cNvSpPr>
+          <p:nvPr>
+            <p:ph idx="1"/>
+          </p:nvPr>
+        </p:nvSpPr>
+        <p:spPr/>
+        <p:txBody>
+          <a:bodyPr>
+            <a:normAutofit/>
+          </a:bodyPr>
+          <a:lstStyle/>
+          <a:p>
+            <a:r>
+              <a:rPr sz="1600" dirty="0"/>
+              <a:t>The confidence intervals give us a range of plausible values for Tau and TS-Slope values </a:t>
+            </a:r>
+            <a:endParaRPr lang="en-US" sz="1600" dirty="0"/>
+          </a:p>
+          <a:p>
+            <a:r>
+              <a:rPr sz="1600" dirty="0"/>
+              <a:t>If a confidence interval contains zero this indicates that the trend is not significant </a:t>
+            </a:r>
+            <a:endParaRPr lang="en-US" sz="1600" dirty="0"/>
+          </a:p>
+          <a:p>
+            <a:r>
+              <a:rPr sz="1600" dirty="0"/>
+              <a:t>We get the same results from the CI’s as we did from the hypothesis tests </a:t>
+            </a:r>
+            <a:endParaRPr lang="en-US" sz="1600" dirty="0"/>
+          </a:p>
+          <a:p>
+            <a:r>
+              <a:rPr sz="1600" dirty="0"/>
+              <a:t>Overall Regional Seasonal trend is positive </a:t>
+            </a:r>
+            <a:endParaRPr lang="en-US" sz="1600" dirty="0"/>
+          </a:p>
+          <a:p>
+            <a:r>
+              <a:rPr sz="1600" dirty="0"/>
+              <a:t>By season we have the greatest trend and largest slope in July</a:t>
+            </a:r>
+          </a:p>
+        </p:txBody>
+      </p:sp>
+    </p:spTree>
+  </p:cSld>
+  <p:clrMapOvr>
+    <a:masterClrMapping/>
+  </p:clrMapOvr>
+</p:sld>
+</file>
+
+<file path=ppt/slides/slide19.xml><?xml version="1.0" encoding="utf-8"?>
+<p:sld xmlns:a="http://schemas.openxmlformats.org/drawingml/2006/main" xmlns:r="http://schemas.openxmlformats.org/officeDocument/2006/relationships" xmlns:p="http://schemas.openxmlformats.org/presentationml/2006/main">
+  <p:cSld>
+    <p:spTree>
+      <p:nvGrpSpPr>
+        <p:cNvPr id="1" name=""/>
+        <p:cNvGrpSpPr/>
+        <p:nvPr/>
+      </p:nvGrpSpPr>
+      <p:grpSpPr>
+        <a:xfrm>
+          <a:off x="0" y="0"/>
+          <a:ext cx="0" cy="0"/>
+          <a:chOff x="0" y="0"/>
+          <a:chExt cx="0" cy="0"/>
+        </a:xfrm>
+      </p:grpSpPr>
+      <p:sp>
+        <p:nvSpPr>
+          <p:cNvPr id="2" name="Title 1"/>
+          <p:cNvSpPr>
+            <a:spLocks noGrp="1"/>
+          </p:cNvSpPr>
+          <p:nvPr>
+            <p:ph type="title"/>
+          </p:nvPr>
+        </p:nvSpPr>
+        <p:spPr/>
+        <p:txBody>
+          <a:bodyPr/>
+          <a:lstStyle/>
+          <a:p>
+            <a:pPr marL="0" lvl="0" indent="0">
+              <a:buNone/>
+            </a:pPr>
+            <a:r>
+              <a:rPr dirty="0"/>
+              <a:t>Conclusion:</a:t>
+            </a:r>
+          </a:p>
+        </p:txBody>
+      </p:sp>
+      <p:sp>
+        <p:nvSpPr>
+          <p:cNvPr id="8" name="TextBox 7">
+            <a:extLst>
+              <a:ext uri="{FF2B5EF4-FFF2-40B4-BE49-F238E27FC236}">
+                <a16:creationId xmlns:a16="http://schemas.microsoft.com/office/drawing/2014/main" id="{36925914-CCF3-7244-926F-5C16FBCDE060}"/>
+              </a:ext>
+            </a:extLst>
+          </p:cNvPr>
+          <p:cNvSpPr txBox="1"/>
+          <p:nvPr/>
+        </p:nvSpPr>
+        <p:spPr>
+          <a:xfrm>
+            <a:off x="906517" y="1063229"/>
+            <a:ext cx="7330965" cy="2308324"/>
+          </a:xfrm>
+          <a:prstGeom prst="rect">
+            <a:avLst/>
+          </a:prstGeom>
+          <a:noFill/>
+        </p:spPr>
+        <p:txBody>
+          <a:bodyPr wrap="square" rtlCol="0">
+            <a:spAutoFit/>
+          </a:bodyPr>
+          <a:lstStyle/>
+          <a:p>
+            <a:pPr marL="285750" indent="-285750">
+              <a:buFont typeface="Arial" panose="020B0604020202020204" pitchFamily="34" charset="0"/>
+              <a:buChar char="•"/>
+            </a:pPr>
+            <a:r>
+              <a:rPr lang="en-US" sz="1600" dirty="0"/>
+              <a:t>The Regional-Seasonal Kendall Test relies on much less restrictive assumptions than linear regression </a:t>
+            </a:r>
+          </a:p>
+          <a:p>
+            <a:pPr marL="285750" indent="-285750">
+              <a:buFont typeface="Arial" panose="020B0604020202020204" pitchFamily="34" charset="0"/>
+              <a:buChar char="•"/>
+            </a:pPr>
+            <a:r>
+              <a:rPr lang="en-US" sz="1600" dirty="0"/>
+              <a:t>Data does not need to be normal and relationship does not need to be linear</a:t>
+            </a:r>
+          </a:p>
+          <a:p>
+            <a:pPr marL="285750" indent="-285750">
+              <a:buFont typeface="Arial" panose="020B0604020202020204" pitchFamily="34" charset="0"/>
+              <a:buChar char="•"/>
+            </a:pPr>
+            <a:r>
+              <a:rPr lang="en-US" sz="1600" dirty="0"/>
+              <a:t>Test accounts for the regional and seasonal nature of the data and  spatial/temporal dependence </a:t>
+            </a:r>
+          </a:p>
+          <a:p>
+            <a:pPr marL="285750" indent="-285750">
+              <a:buFont typeface="Arial" panose="020B0604020202020204" pitchFamily="34" charset="0"/>
+              <a:buChar char="•"/>
+            </a:pPr>
+            <a:r>
+              <a:rPr lang="en-US" sz="1600" dirty="0"/>
+              <a:t>Based on this test we can conclude that the water temperature is increasing over time in Priest Lake</a:t>
+            </a:r>
+          </a:p>
+          <a:p>
+            <a:pPr marL="285750" indent="-285750">
+              <a:buFont typeface="Arial" panose="020B0604020202020204" pitchFamily="34" charset="0"/>
+              <a:buChar char="•"/>
+            </a:pPr>
+            <a:r>
+              <a:rPr lang="en-US" sz="1600" dirty="0"/>
+              <a:t>The most significant trend and largest rate of increase is in July</a:t>
+            </a:r>
+          </a:p>
+          <a:p>
+            <a:pPr marL="285750" indent="-285750">
+              <a:buFont typeface="Arial" panose="020B0604020202020204" pitchFamily="34" charset="0"/>
+              <a:buChar char="•"/>
+            </a:pPr>
+            <a:endParaRPr lang="en-US" sz="1600" dirty="0"/>
+          </a:p>
+        </p:txBody>
+      </p:sp>
+    </p:spTree>
+  </p:cSld>
+  <p:clrMapOvr>
+    <a:masterClrMapping/>
+  </p:clrMapOvr>
+</p:sld>
+</file>
+
+<file path=ppt/slides/slide2.xml><?xml version="1.0" encoding="utf-8"?>
+<p:sld xmlns:a="http://schemas.openxmlformats.org/drawingml/2006/main" xmlns:r="http://schemas.openxmlformats.org/officeDocument/2006/relationships" xmlns:p="http://schemas.openxmlformats.org/presentationml/2006/main">
+  <p:cSld>
+    <p:spTree>
+      <p:nvGrpSpPr>
+        <p:cNvPr id="1" name=""/>
+        <p:cNvGrpSpPr/>
+        <p:nvPr/>
+      </p:nvGrpSpPr>
+      <p:grpSpPr>
+        <a:xfrm>
+          <a:off x="0" y="0"/>
+          <a:ext cx="0" cy="0"/>
+          <a:chOff x="0" y="0"/>
+          <a:chExt cx="0" cy="0"/>
+        </a:xfrm>
+      </p:grpSpPr>
+      <p:sp>
+        <p:nvSpPr>
+          <p:cNvPr id="2" name="Title 1"/>
+          <p:cNvSpPr>
+            <a:spLocks noGrp="1"/>
+          </p:cNvSpPr>
+          <p:nvPr>
+            <p:ph type="title"/>
+          </p:nvPr>
+        </p:nvSpPr>
+        <p:spPr>
+          <a:xfrm>
+            <a:off x="457201" y="204787"/>
+            <a:ext cx="7754982" cy="674779"/>
+          </a:xfrm>
+        </p:spPr>
+        <p:txBody>
+          <a:bodyPr>
+            <a:normAutofit/>
+          </a:bodyPr>
+          <a:lstStyle/>
+          <a:p>
+            <a:pPr marL="0" lvl="0" indent="0" algn="ctr">
+              <a:buNone/>
+            </a:pPr>
+            <a:r>
+              <a:rPr sz="3300" b="0" dirty="0"/>
+              <a:t>The Data</a:t>
+            </a:r>
+          </a:p>
+        </p:txBody>
+      </p:sp>
+      <p:sp>
+        <p:nvSpPr>
+          <p:cNvPr id="4" name="Text Placeholder 3"/>
+          <p:cNvSpPr>
+            <a:spLocks noGrp="1"/>
+          </p:cNvSpPr>
+          <p:nvPr>
+            <p:ph type="body" sz="half" idx="2"/>
+          </p:nvPr>
+        </p:nvSpPr>
+        <p:spPr>
+          <a:xfrm>
+            <a:off x="457201" y="1076326"/>
+            <a:ext cx="7458890" cy="3518297"/>
+          </a:xfrm>
+        </p:spPr>
+        <p:txBody>
+          <a:bodyPr>
+            <a:normAutofit/>
+          </a:bodyPr>
+          <a:lstStyle/>
+          <a:p>
+            <a:pPr marL="285750" lvl="0" indent="-285750">
+              <a:buFont typeface="Arial" panose="020B0604020202020204" pitchFamily="34" charset="0"/>
+              <a:buChar char="•"/>
+            </a:pPr>
+            <a:r>
+              <a:rPr sz="1600" dirty="0"/>
+              <a:t>Data consists of temperature measurements from Priest Lake </a:t>
+            </a:r>
+            <a:endParaRPr lang="en-US" sz="1600" dirty="0"/>
+          </a:p>
+          <a:p>
+            <a:pPr marL="285750" lvl="0" indent="-285750">
+              <a:buFont typeface="Arial" panose="020B0604020202020204" pitchFamily="34" charset="0"/>
+              <a:buChar char="•"/>
+            </a:pPr>
+            <a:r>
+              <a:rPr sz="1600" dirty="0"/>
+              <a:t>Only Data from top meter is used </a:t>
+            </a:r>
+            <a:endParaRPr lang="en-US" sz="1600" dirty="0"/>
+          </a:p>
+          <a:p>
+            <a:pPr marL="285750" lvl="0" indent="-285750">
+              <a:buFont typeface="Arial" panose="020B0604020202020204" pitchFamily="34" charset="0"/>
+              <a:buChar char="•"/>
+            </a:pPr>
+            <a:r>
+              <a:rPr sz="1600" dirty="0"/>
+              <a:t>Data is only used from the sites KALI, PLNO, and PLSO and months June, July, August, and September </a:t>
+            </a:r>
+            <a:endParaRPr lang="en-US" sz="1600" dirty="0"/>
+          </a:p>
+          <a:p>
+            <a:pPr marL="285750" lvl="0" indent="-285750">
+              <a:buFont typeface="Arial" panose="020B0604020202020204" pitchFamily="34" charset="0"/>
+              <a:buChar char="•"/>
+            </a:pPr>
+            <a:r>
+              <a:rPr sz="1600" dirty="0"/>
+              <a:t>Other sites and months contain too little data or </a:t>
+            </a:r>
+            <a:r>
+              <a:rPr lang="en-US" sz="1600" dirty="0"/>
+              <a:t>have</a:t>
+            </a:r>
+            <a:r>
+              <a:rPr sz="1600" dirty="0"/>
+              <a:t> too large of gaps between observations</a:t>
+            </a:r>
+          </a:p>
+        </p:txBody>
+      </p:sp>
+    </p:spTree>
+  </p:cSld>
+  <p:clrMapOvr>
+    <a:masterClrMapping/>
+  </p:clrMapOvr>
+</p:sld>
+</file>
+
+<file path=ppt/slides/slide20.xml><?xml version="1.0" encoding="utf-8"?>
+<p:sld xmlns:a="http://schemas.openxmlformats.org/drawingml/2006/main" xmlns:r="http://schemas.openxmlformats.org/officeDocument/2006/relationships" xmlns:p="http://schemas.openxmlformats.org/presentationml/2006/main">
+  <p:cSld>
+    <p:spTree>
+      <p:nvGrpSpPr>
+        <p:cNvPr id="1" name=""/>
+        <p:cNvGrpSpPr/>
+        <p:nvPr/>
+      </p:nvGrpSpPr>
+      <p:grpSpPr>
+        <a:xfrm>
+          <a:off x="0" y="0"/>
+          <a:ext cx="0" cy="0"/>
+          <a:chOff x="0" y="0"/>
+          <a:chExt cx="0" cy="0"/>
+        </a:xfrm>
+      </p:grpSpPr>
+      <p:sp>
+        <p:nvSpPr>
+          <p:cNvPr id="2" name="Title 1"/>
+          <p:cNvSpPr>
+            <a:spLocks noGrp="1"/>
+          </p:cNvSpPr>
+          <p:nvPr>
+            <p:ph type="title"/>
+          </p:nvPr>
+        </p:nvSpPr>
+        <p:spPr/>
+        <p:txBody>
+          <a:bodyPr/>
+          <a:lstStyle/>
+          <a:p>
+            <a:pPr marL="0" lvl="0" indent="0">
+              <a:buNone/>
+            </a:pPr>
+            <a:r>
+              <a:rPr dirty="0" err="1"/>
+              <a:t>Refrences</a:t>
+            </a:r>
+            <a:r>
+              <a:rPr dirty="0"/>
+              <a:t>:</a:t>
+            </a:r>
+          </a:p>
+        </p:txBody>
+      </p:sp>
+      <p:sp>
+        <p:nvSpPr>
+          <p:cNvPr id="3" name="Content Placeholder 2"/>
+          <p:cNvSpPr>
+            <a:spLocks noGrp="1"/>
+          </p:cNvSpPr>
+          <p:nvPr>
+            <p:ph idx="1"/>
+          </p:nvPr>
+        </p:nvSpPr>
+        <p:spPr/>
+        <p:txBody>
+          <a:bodyPr>
+            <a:normAutofit/>
+          </a:bodyPr>
+          <a:lstStyle/>
+          <a:p>
+            <a:pPr marL="0" lvl="0" indent="0">
+              <a:buNone/>
+            </a:pPr>
+            <a:r>
+              <a:rPr sz="1600" dirty="0"/>
+              <a:t>Design Trend Seasonal Kendall. (n.d.). </a:t>
+            </a:r>
+            <a:r>
+              <a:rPr sz="1600" dirty="0" err="1"/>
+              <a:t>Vsp.pnnl.gov</a:t>
+            </a:r>
+            <a:r>
+              <a:rPr sz="1600" dirty="0"/>
+              <a:t>. </a:t>
+            </a:r>
+            <a:r>
+              <a:rPr sz="1600" dirty="0">
+                <a:hlinkClick r:id="rId2"/>
+              </a:rPr>
+              <a:t>https://vsp.pnnl.gov/help/Vsample/Design_Trend_Seasonal_Kendall.htm</a:t>
+            </a:r>
+          </a:p>
+          <a:p>
+            <a:pPr marL="0" lvl="0" indent="0">
+              <a:buNone/>
+            </a:pPr>
+            <a:r>
+              <a:rPr sz="1600" dirty="0" err="1"/>
+              <a:t>Helsel</a:t>
+            </a:r>
+            <a:r>
+              <a:rPr sz="1600" dirty="0"/>
+              <a:t>, D. R., &amp; Hirsch, R. M. (2020). Statistical methods in water resources (pp. 342–349). U.S. Geological Survey.</a:t>
+            </a:r>
+          </a:p>
+          <a:p>
+            <a:pPr marL="0" lvl="0" indent="0">
+              <a:buNone/>
+            </a:pPr>
+            <a:r>
+              <a:rPr sz="1600" dirty="0"/>
+              <a:t>Hirsch, R. M., &amp; Slack, J. R. (1984). A Nonparametric Trend Test for Seasonal Data With Serial Dependence. Water Resources Research, 20(6), 727–732. </a:t>
+            </a:r>
+            <a:r>
+              <a:rPr sz="1600" dirty="0">
+                <a:hlinkClick r:id="rId3"/>
+              </a:rPr>
+              <a:t>https://doi.org/10.1029/wr020i006p00727</a:t>
+            </a:r>
+          </a:p>
+          <a:p>
+            <a:pPr marL="0" lvl="0" indent="0">
+              <a:buNone/>
+            </a:pPr>
+            <a:r>
+              <a:rPr sz="1600" dirty="0"/>
+              <a:t>Mann, H. B. (1945). Nonparametric Tests Against Trend. </a:t>
+            </a:r>
+            <a:r>
+              <a:rPr sz="1600" dirty="0" err="1"/>
+              <a:t>Econometrica</a:t>
+            </a:r>
+            <a:r>
+              <a:rPr sz="1600" dirty="0"/>
+              <a:t>, 13(3), 245. </a:t>
+            </a:r>
+            <a:r>
+              <a:rPr sz="1600" dirty="0">
+                <a:hlinkClick r:id="rId4"/>
+              </a:rPr>
+              <a:t>https://doi.org/10.2307/1907187</a:t>
+            </a:r>
+            <a:r>
+              <a:rPr sz="1600" dirty="0"/>
+              <a:t>‌</a:t>
+            </a:r>
+          </a:p>
+          <a:p>
+            <a:pPr marL="0" lvl="0" indent="0">
+              <a:buNone/>
+            </a:pPr>
+            <a:r>
+              <a:rPr sz="1600" dirty="0" err="1"/>
+              <a:t>Marchetto</a:t>
+            </a:r>
+            <a:r>
+              <a:rPr sz="1600" dirty="0"/>
+              <a:t>, A. (2024). </a:t>
+            </a:r>
+            <a:r>
+              <a:rPr sz="1600" dirty="0" err="1"/>
+              <a:t>rkt</a:t>
+            </a:r>
+            <a:r>
+              <a:rPr sz="1600" dirty="0"/>
+              <a:t>: Mann-Kendall Test, Seasonal and Regional Kendall Tests. R-</a:t>
+            </a:r>
+            <a:r>
+              <a:rPr sz="1600" dirty="0" err="1"/>
+              <a:t>Project.org</a:t>
+            </a:r>
+            <a:r>
+              <a:rPr sz="1600" dirty="0"/>
+              <a:t>. </a:t>
+            </a:r>
+            <a:r>
+              <a:rPr sz="1600" dirty="0">
+                <a:hlinkClick r:id="rId5"/>
+              </a:rPr>
+              <a:t>https://cran.r-project.org/package=rkt</a:t>
+            </a:r>
+          </a:p>
+        </p:txBody>
+      </p:sp>
+    </p:spTree>
+  </p:cSld>
+  <p:clrMapOvr>
+    <a:masterClrMapping/>
+  </p:clrMapOvr>
+</p:sld>
+</file>
+
+<file path=ppt/slides/slide3.xml><?xml version="1.0" encoding="utf-8"?>
+<p:sld xmlns:a="http://schemas.openxmlformats.org/drawingml/2006/main" xmlns:r="http://schemas.openxmlformats.org/officeDocument/2006/relationships" xmlns:p="http://schemas.openxmlformats.org/presentationml/2006/main">
+  <p:cSld>
+    <p:spTree>
+      <p:nvGrpSpPr>
+        <p:cNvPr id="1" name=""/>
+        <p:cNvGrpSpPr/>
+        <p:nvPr/>
+      </p:nvGrpSpPr>
+      <p:grpSpPr>
+        <a:xfrm>
+          <a:off x="0" y="0"/>
+          <a:ext cx="0" cy="0"/>
+          <a:chOff x="0" y="0"/>
+          <a:chExt cx="0" cy="0"/>
+        </a:xfrm>
+      </p:grpSpPr>
+      <p:sp>
+        <p:nvSpPr>
+          <p:cNvPr id="2" name="Title 1"/>
+          <p:cNvSpPr>
+            <a:spLocks noGrp="1"/>
+          </p:cNvSpPr>
+          <p:nvPr>
+            <p:ph type="title"/>
+          </p:nvPr>
+        </p:nvSpPr>
+        <p:spPr/>
+        <p:txBody>
+          <a:bodyPr/>
+          <a:lstStyle/>
+          <a:p>
+            <a:pPr marL="0" lvl="0" indent="0">
+              <a:buNone/>
+            </a:pPr>
+            <a:r>
+              <a:rPr dirty="0"/>
+              <a:t>Is temperature increasing over time?</a:t>
+            </a:r>
+          </a:p>
+        </p:txBody>
+      </p:sp>
+      <mc:AlternateContent xmlns:mc="http://schemas.openxmlformats.org/markup-compatibility/2006" xmlns:a14="http://schemas.microsoft.com/office/drawing/2010/main">
+        <mc:Choice Requires="a14">
+          <p:sp>
+            <p:nvSpPr>
+              <p:cNvPr id="3" name="Content Placeholder 2"/>
+              <p:cNvSpPr>
+                <a:spLocks noGrp="1"/>
+              </p:cNvSpPr>
+              <p:nvPr>
+                <p:ph idx="1"/>
+              </p:nvPr>
+            </p:nvSpPr>
+            <p:spPr/>
+            <p:txBody>
+              <a:bodyPr>
+                <a:normAutofit/>
+              </a:bodyPr>
+              <a:lstStyle/>
+              <a:p>
+                <a:pPr marL="0" lvl="0" indent="0">
+                  <a:buNone/>
+                </a:pPr>
+                <a:r>
+                  <a:rPr sz="1600" dirty="0"/>
+                  <a:t>Two ways to test this:</a:t>
+                </a:r>
+              </a:p>
+              <a:p>
+                <a:r>
+                  <a:rPr sz="1600" dirty="0"/>
+                  <a:t>Fit a parametric function to model the central tendency (i.e. mean or median) of the data over time: </a:t>
+                </a:r>
+                <a:endParaRPr lang="en-US" sz="1600" dirty="0"/>
+              </a:p>
+              <a:p>
+                <a:pPr lvl="1"/>
+                <a:r>
+                  <a:rPr sz="1300" dirty="0"/>
+                  <a:t>Simplest example of this is linear Regression (i.e. modeling temperature as a linear function of time) </a:t>
+                </a:r>
+                <a:endParaRPr lang="en-US" sz="1300" dirty="0"/>
+              </a:p>
+              <a:p>
+                <a:pPr lvl="1"/>
+                <a:r>
+                  <a:rPr sz="1300" dirty="0"/>
+                  <a:t>If the regression line has a positive slope this is evidence of an increasing trend</a:t>
+                </a:r>
+              </a:p>
+              <a:p>
+                <a:r>
+                  <a:rPr sz="1600" dirty="0"/>
+                  <a:t>Look at the pairs of observations: </a:t>
+                </a:r>
+                <a:endParaRPr lang="en-US" sz="1600" dirty="0"/>
+              </a:p>
+              <a:p>
+                <a:pPr lvl="1"/>
+                <a:r>
+                  <a:rPr sz="1300" dirty="0"/>
+                  <a:t>For each pair of successive observations </a:t>
+                </a:r>
+                <a14:m>
+                  <m:oMath xmlns:m="http://schemas.openxmlformats.org/officeDocument/2006/math">
+                    <m:sSub>
+                      <m:sSubPr>
+                        <m:ctrlPr>
+                          <a:rPr sz="1300" i="1">
+                            <a:latin typeface="Cambria Math" panose="02040503050406030204" pitchFamily="18" charset="0"/>
+                          </a:rPr>
+                        </m:ctrlPr>
+                      </m:sSubPr>
+                      <m:e>
+                        <m:r>
+                          <a:rPr sz="1300">
+                            <a:latin typeface="Cambria Math" panose="02040503050406030204" pitchFamily="18" charset="0"/>
+                          </a:rPr>
+                          <m:t>𝑦</m:t>
+                        </m:r>
+                      </m:e>
+                      <m:sub>
+                        <m:r>
+                          <a:rPr sz="1300">
+                            <a:latin typeface="Cambria Math" panose="02040503050406030204" pitchFamily="18" charset="0"/>
+                          </a:rPr>
+                          <m:t>𝑖</m:t>
+                        </m:r>
+                      </m:sub>
+                    </m:sSub>
+                    <m:r>
+                      <a:rPr sz="1300">
+                        <a:latin typeface="Cambria Math" panose="02040503050406030204" pitchFamily="18" charset="0"/>
+                      </a:rPr>
+                      <m:t>,</m:t>
+                    </m:r>
+                    <m:sSub>
+                      <m:sSubPr>
+                        <m:ctrlPr>
+                          <a:rPr sz="1300" i="1">
+                            <a:latin typeface="Cambria Math" panose="02040503050406030204" pitchFamily="18" charset="0"/>
+                          </a:rPr>
+                        </m:ctrlPr>
+                      </m:sSubPr>
+                      <m:e>
+                        <m:r>
+                          <a:rPr sz="1300">
+                            <a:latin typeface="Cambria Math" panose="02040503050406030204" pitchFamily="18" charset="0"/>
+                          </a:rPr>
+                          <m:t>𝑦</m:t>
+                        </m:r>
+                      </m:e>
+                      <m:sub>
+                        <m:r>
+                          <a:rPr sz="1300">
+                            <a:latin typeface="Cambria Math" panose="02040503050406030204" pitchFamily="18" charset="0"/>
+                          </a:rPr>
+                          <m:t>𝑗</m:t>
+                        </m:r>
+                      </m:sub>
+                    </m:sSub>
+                  </m:oMath>
+                </a14:m>
+                <a:r>
+                  <a:rPr sz="1300" dirty="0"/>
+                  <a:t> measured at times </a:t>
+                </a:r>
+                <a14:m>
+                  <m:oMath xmlns:m="http://schemas.openxmlformats.org/officeDocument/2006/math">
+                    <m:r>
+                      <a:rPr sz="1300">
+                        <a:latin typeface="Cambria Math" panose="02040503050406030204" pitchFamily="18" charset="0"/>
+                      </a:rPr>
+                      <m:t>𝑖</m:t>
+                    </m:r>
+                    <m:r>
+                      <a:rPr sz="1300">
+                        <a:latin typeface="Cambria Math" panose="02040503050406030204" pitchFamily="18" charset="0"/>
+                      </a:rPr>
+                      <m:t>&lt;</m:t>
+                    </m:r>
+                    <m:r>
+                      <a:rPr sz="1300">
+                        <a:latin typeface="Cambria Math" panose="02040503050406030204" pitchFamily="18" charset="0"/>
+                      </a:rPr>
+                      <m:t>𝑗</m:t>
+                    </m:r>
+                  </m:oMath>
+                </a14:m>
+                <a:r>
+                  <a:rPr sz="1300" dirty="0"/>
+                  <a:t>,how many increase over time (i.e. </a:t>
+                </a:r>
+                <a14:m>
+                  <m:oMath xmlns:m="http://schemas.openxmlformats.org/officeDocument/2006/math">
+                    <m:sSub>
+                      <m:sSubPr>
+                        <m:ctrlPr>
+                          <a:rPr sz="1300" i="1">
+                            <a:latin typeface="Cambria Math" panose="02040503050406030204" pitchFamily="18" charset="0"/>
+                          </a:rPr>
+                        </m:ctrlPr>
+                      </m:sSubPr>
+                      <m:e>
+                        <m:r>
+                          <a:rPr sz="1300">
+                            <a:latin typeface="Cambria Math" panose="02040503050406030204" pitchFamily="18" charset="0"/>
+                          </a:rPr>
+                          <m:t>𝑦</m:t>
+                        </m:r>
+                      </m:e>
+                      <m:sub>
+                        <m:r>
+                          <a:rPr sz="1300">
+                            <a:latin typeface="Cambria Math" panose="02040503050406030204" pitchFamily="18" charset="0"/>
+                          </a:rPr>
+                          <m:t>𝑖</m:t>
+                        </m:r>
+                      </m:sub>
+                    </m:sSub>
+                    <m:r>
+                      <a:rPr sz="1300">
+                        <a:latin typeface="Cambria Math" panose="02040503050406030204" pitchFamily="18" charset="0"/>
+                      </a:rPr>
+                      <m:t>&lt;</m:t>
+                    </m:r>
+                    <m:sSub>
+                      <m:sSubPr>
+                        <m:ctrlPr>
+                          <a:rPr sz="1300" i="1">
+                            <a:latin typeface="Cambria Math" panose="02040503050406030204" pitchFamily="18" charset="0"/>
+                          </a:rPr>
+                        </m:ctrlPr>
+                      </m:sSubPr>
+                      <m:e>
+                        <m:r>
+                          <a:rPr sz="1300">
+                            <a:latin typeface="Cambria Math" panose="02040503050406030204" pitchFamily="18" charset="0"/>
+                          </a:rPr>
+                          <m:t>𝑦</m:t>
+                        </m:r>
+                      </m:e>
+                      <m:sub>
+                        <m:r>
+                          <a:rPr sz="1300">
+                            <a:latin typeface="Cambria Math" panose="02040503050406030204" pitchFamily="18" charset="0"/>
+                          </a:rPr>
+                          <m:t>𝑗</m:t>
+                        </m:r>
+                      </m:sub>
+                    </m:sSub>
+                  </m:oMath>
+                </a14:m>
+                <a:r>
+                  <a:rPr sz="1300" dirty="0"/>
+                  <a:t>) and how many decrease or stay the same? </a:t>
+                </a:r>
+                <a:endParaRPr lang="en-US" sz="1300" dirty="0"/>
+              </a:p>
+              <a:p>
+                <a:pPr lvl="1"/>
+                <a:r>
+                  <a:rPr sz="1300" dirty="0"/>
+                  <a:t>If more of the pairs increase over time than decrease this is evidence of an increasing trend</a:t>
+                </a:r>
+              </a:p>
+            </p:txBody>
+          </p:sp>
+        </mc:Choice>
+        <mc:Fallback xmlns="">
+          <p:sp>
+            <p:nvSpPr>
+              <p:cNvPr id="3" name="Content Placeholder 2"/>
+              <p:cNvSpPr>
+                <a:spLocks noGrp="1" noRot="1" noChangeAspect="1" noMove="1" noResize="1" noEditPoints="1" noAdjustHandles="1" noChangeArrowheads="1" noChangeShapeType="1" noTextEdit="1"/>
+              </p:cNvSpPr>
+              <p:nvPr>
+                <p:ph idx="1"/>
+              </p:nvPr>
+            </p:nvSpPr>
+            <p:spPr>
+              <a:blipFill>
+                <a:blip r:embed="rId2"/>
+                <a:stretch>
+                  <a:fillRect l="-463" t="-373"/>
+                </a:stretch>
+              </a:blipFill>
+            </p:spPr>
+            <p:txBody>
+              <a:bodyPr/>
+              <a:lstStyle/>
+              <a:p>
+                <a:r>
+                  <a:rPr lang="en-US">
+                    <a:noFill/>
+                  </a:rPr>
+                  <a:t> </a:t>
+                </a:r>
+              </a:p>
+            </p:txBody>
+          </p:sp>
+        </mc:Fallback>
+      </mc:AlternateContent>
+    </p:spTree>
+  </p:cSld>
+  <p:clrMapOvr>
+    <a:masterClrMapping/>
+  </p:clrMapOvr>
+</p:sld>
+</file>
+
+<file path=ppt/slides/slide4.xml><?xml version="1.0" encoding="utf-8"?>
+<p:sld xmlns:a="http://schemas.openxmlformats.org/drawingml/2006/main" xmlns:r="http://schemas.openxmlformats.org/officeDocument/2006/relationships" xmlns:p="http://schemas.openxmlformats.org/presentationml/2006/main">
+  <p:cSld>
+    <p:spTree>
+      <p:nvGrpSpPr>
+        <p:cNvPr id="1" name=""/>
+        <p:cNvGrpSpPr/>
+        <p:nvPr/>
+      </p:nvGrpSpPr>
+      <p:grpSpPr>
+        <a:xfrm>
+          <a:off x="0" y="0"/>
+          <a:ext cx="0" cy="0"/>
+          <a:chOff x="0" y="0"/>
+          <a:chExt cx="0" cy="0"/>
+        </a:xfrm>
+      </p:grpSpPr>
+      <p:sp>
+        <p:nvSpPr>
+          <p:cNvPr id="5" name="TextBox 4">
+            <a:extLst>
+              <a:ext uri="{FF2B5EF4-FFF2-40B4-BE49-F238E27FC236}">
+                <a16:creationId xmlns:a16="http://schemas.microsoft.com/office/drawing/2014/main" id="{25F2AECF-1F00-724F-BA31-4DDF324546D4}"/>
+              </a:ext>
+            </a:extLst>
+          </p:cNvPr>
+          <p:cNvSpPr txBox="1"/>
+          <p:nvPr/>
+        </p:nvSpPr>
+        <p:spPr>
+          <a:xfrm>
+            <a:off x="927644" y="235859"/>
+            <a:ext cx="7019107" cy="600164"/>
+          </a:xfrm>
+          <a:prstGeom prst="rect">
+            <a:avLst/>
+          </a:prstGeom>
+          <a:noFill/>
+        </p:spPr>
+        <p:txBody>
+          <a:bodyPr wrap="square" rtlCol="0">
+            <a:spAutoFit/>
+          </a:bodyPr>
+          <a:lstStyle/>
+          <a:p>
+            <a:pPr algn="ctr"/>
+            <a:r>
+              <a:rPr lang="en-US" sz="3300" dirty="0"/>
+              <a:t>Can we use Linear Regression?</a:t>
+            </a:r>
+            <a:r>
+              <a:rPr lang="en-US" dirty="0"/>
+              <a:t> </a:t>
+            </a:r>
+          </a:p>
+        </p:txBody>
+      </p:sp>
+      <p:pic>
+        <p:nvPicPr>
+          <p:cNvPr id="4" name="Picture 3">
+            <a:extLst>
+              <a:ext uri="{FF2B5EF4-FFF2-40B4-BE49-F238E27FC236}">
+                <a16:creationId xmlns:a16="http://schemas.microsoft.com/office/drawing/2014/main" id="{187F296F-753B-CF4B-B14A-8A0A1A644A80}"/>
+              </a:ext>
+            </a:extLst>
+          </p:cNvPr>
+          <p:cNvPicPr>
+            <a:picLocks noChangeAspect="1"/>
+          </p:cNvPicPr>
+          <p:nvPr/>
+        </p:nvPicPr>
+        <p:blipFill>
+          <a:blip r:embed="rId2"/>
+          <a:stretch>
+            <a:fillRect/>
+          </a:stretch>
+        </p:blipFill>
+        <p:spPr>
+          <a:xfrm>
+            <a:off x="1133665" y="836023"/>
+            <a:ext cx="6607063" cy="4223657"/>
+          </a:xfrm>
+          <a:prstGeom prst="rect">
+            <a:avLst/>
+          </a:prstGeom>
+        </p:spPr>
+      </p:pic>
+    </p:spTree>
+  </p:cSld>
+  <p:clrMapOvr>
+    <a:masterClrMapping/>
+  </p:clrMapOvr>
+</p:sld>
+</file>
+
+<file path=ppt/slides/slide5.xml><?xml version="1.0" encoding="utf-8"?>
+<p:sld xmlns:a="http://schemas.openxmlformats.org/drawingml/2006/main" xmlns:r="http://schemas.openxmlformats.org/officeDocument/2006/relationships" xmlns:p="http://schemas.openxmlformats.org/presentationml/2006/main">
+  <p:cSld>
+    <p:spTree>
+      <p:nvGrpSpPr>
+        <p:cNvPr id="1" name=""/>
+        <p:cNvGrpSpPr/>
+        <p:nvPr/>
+      </p:nvGrpSpPr>
+      <p:grpSpPr>
+        <a:xfrm>
+          <a:off x="0" y="0"/>
+          <a:ext cx="0" cy="0"/>
+          <a:chOff x="0" y="0"/>
+          <a:chExt cx="0" cy="0"/>
+        </a:xfrm>
+      </p:grpSpPr>
+      <p:sp>
+        <p:nvSpPr>
+          <p:cNvPr id="2" name="Title 1"/>
+          <p:cNvSpPr>
+            <a:spLocks noGrp="1"/>
+          </p:cNvSpPr>
+          <p:nvPr>
+            <p:ph type="title"/>
+          </p:nvPr>
+        </p:nvSpPr>
+        <p:spPr/>
+        <p:txBody>
+          <a:bodyPr/>
+          <a:lstStyle/>
+          <a:p>
+            <a:pPr marL="0" lvl="0" indent="0">
+              <a:buNone/>
+            </a:pPr>
+            <a:r>
+              <a:rPr dirty="0"/>
+              <a:t>Problems With Using Linear Regression:</a:t>
+            </a:r>
+          </a:p>
+        </p:txBody>
+      </p:sp>
+      <mc:AlternateContent xmlns:mc="http://schemas.openxmlformats.org/markup-compatibility/2006" xmlns:a14="http://schemas.microsoft.com/office/drawing/2010/main">
+        <mc:Choice Requires="a14">
+          <p:sp>
+            <p:nvSpPr>
+              <p:cNvPr id="3" name="Content Placeholder 2"/>
+              <p:cNvSpPr>
+                <a:spLocks noGrp="1"/>
+              </p:cNvSpPr>
+              <p:nvPr>
+                <p:ph idx="1"/>
+              </p:nvPr>
+            </p:nvSpPr>
+            <p:spPr/>
+            <p:txBody>
+              <a:bodyPr>
+                <a:normAutofit/>
+              </a:bodyPr>
+              <a:lstStyle/>
+              <a:p>
+                <a:pPr lvl="0"/>
+                <a:r>
+                  <a:rPr sz="1600" dirty="0"/>
+                  <a:t>Assumes data is normally distributed</a:t>
+                </a:r>
+              </a:p>
+              <a:p>
+                <a:pPr lvl="0"/>
+                <a:r>
+                  <a:rPr sz="1600" dirty="0"/>
+                  <a:t>Assumes Relationship between x and y is linear</a:t>
+                </a:r>
+              </a:p>
+              <a:p>
+                <a:pPr lvl="0"/>
+                <a:r>
+                  <a:rPr sz="1600" dirty="0"/>
+                  <a:t>Doesn’t account for the Seasonal and Regional nature of the data</a:t>
+                </a:r>
+              </a:p>
+              <a:p>
+                <a:pPr lvl="0"/>
+                <a:r>
+                  <a:rPr sz="1600" dirty="0"/>
+                  <a:t>Doesn’t account for spatial or temporal dependence between observations (i.e. correlation between </a:t>
+                </a:r>
+                <a14:m>
+                  <m:oMath xmlns:m="http://schemas.openxmlformats.org/officeDocument/2006/math">
+                    <m:sSub>
+                      <m:sSubPr>
+                        <m:ctrlPr>
+                          <a:rPr sz="1600" i="1">
+                            <a:latin typeface="Cambria Math" panose="02040503050406030204" pitchFamily="18" charset="0"/>
+                          </a:rPr>
+                        </m:ctrlPr>
+                      </m:sSubPr>
+                      <m:e>
+                        <m:r>
+                          <a:rPr sz="1600">
+                            <a:latin typeface="Cambria Math" panose="02040503050406030204" pitchFamily="18" charset="0"/>
+                          </a:rPr>
+                          <m:t>𝑌</m:t>
+                        </m:r>
+                      </m:e>
+                      <m:sub>
+                        <m:r>
+                          <a:rPr sz="1600">
+                            <a:latin typeface="Cambria Math" panose="02040503050406030204" pitchFamily="18" charset="0"/>
+                          </a:rPr>
+                          <m:t>𝑖</m:t>
+                        </m:r>
+                      </m:sub>
+                    </m:sSub>
+                  </m:oMath>
+                </a14:m>
+                <a:r>
+                  <a:rPr sz="1600" dirty="0"/>
+                  <a:t> and </a:t>
+                </a:r>
+                <a14:m>
+                  <m:oMath xmlns:m="http://schemas.openxmlformats.org/officeDocument/2006/math">
+                    <m:sSub>
+                      <m:sSubPr>
+                        <m:ctrlPr>
+                          <a:rPr sz="1600" i="1">
+                            <a:latin typeface="Cambria Math" panose="02040503050406030204" pitchFamily="18" charset="0"/>
+                          </a:rPr>
+                        </m:ctrlPr>
+                      </m:sSubPr>
+                      <m:e>
+                        <m:r>
+                          <a:rPr sz="1600">
+                            <a:latin typeface="Cambria Math" panose="02040503050406030204" pitchFamily="18" charset="0"/>
+                          </a:rPr>
+                          <m:t>𝑌</m:t>
+                        </m:r>
+                      </m:e>
+                      <m:sub>
+                        <m:r>
+                          <a:rPr sz="1600">
+                            <a:latin typeface="Cambria Math" panose="02040503050406030204" pitchFamily="18" charset="0"/>
+                          </a:rPr>
+                          <m:t>𝑗</m:t>
+                        </m:r>
+                      </m:sub>
+                    </m:sSub>
+                  </m:oMath>
+                </a14:m>
+                <a:r>
+                  <a:rPr sz="1600" dirty="0"/>
+                  <a:t> is assumed to be zero for </a:t>
+                </a:r>
+                <a14:m>
+                  <m:oMath xmlns:m="http://schemas.openxmlformats.org/officeDocument/2006/math">
+                    <m:r>
+                      <a:rPr sz="1600">
+                        <a:latin typeface="Cambria Math" panose="02040503050406030204" pitchFamily="18" charset="0"/>
+                      </a:rPr>
+                      <m:t>𝑖</m:t>
+                    </m:r>
+                    <m:r>
+                      <a:rPr sz="1600">
+                        <a:latin typeface="Cambria Math" panose="02040503050406030204" pitchFamily="18" charset="0"/>
+                      </a:rPr>
+                      <m:t>≠</m:t>
+                    </m:r>
+                    <m:r>
+                      <a:rPr sz="1600">
+                        <a:latin typeface="Cambria Math" panose="02040503050406030204" pitchFamily="18" charset="0"/>
+                      </a:rPr>
+                      <m:t>𝑗</m:t>
+                    </m:r>
+                  </m:oMath>
+                </a14:m>
+                <a:r>
+                  <a:rPr sz="1600" dirty="0"/>
+                  <a:t>)</a:t>
+                </a:r>
+              </a:p>
+            </p:txBody>
+          </p:sp>
+        </mc:Choice>
+        <mc:Fallback xmlns="">
+          <p:sp>
+            <p:nvSpPr>
+              <p:cNvPr id="3" name="Content Placeholder 2"/>
+              <p:cNvSpPr>
+                <a:spLocks noGrp="1" noRot="1" noChangeAspect="1" noMove="1" noResize="1" noEditPoints="1" noAdjustHandles="1" noChangeArrowheads="1" noChangeShapeType="1" noTextEdit="1"/>
+              </p:cNvSpPr>
+              <p:nvPr>
+                <p:ph idx="1"/>
+              </p:nvPr>
+            </p:nvSpPr>
+            <p:spPr>
+              <a:blipFill>
+                <a:blip r:embed="rId2"/>
+                <a:stretch>
+                  <a:fillRect l="-309" t="-373"/>
+                </a:stretch>
+              </a:blipFill>
+            </p:spPr>
+            <p:txBody>
+              <a:bodyPr/>
+              <a:lstStyle/>
+              <a:p>
+                <a:r>
+                  <a:rPr lang="en-US">
+                    <a:noFill/>
+                  </a:rPr>
+                  <a:t> </a:t>
+                </a:r>
+              </a:p>
+            </p:txBody>
+          </p:sp>
+        </mc:Fallback>
+      </mc:AlternateContent>
+    </p:spTree>
+  </p:cSld>
+  <p:clrMapOvr>
+    <a:masterClrMapping/>
+  </p:clrMapOvr>
+</p:sld>
+</file>
+
+<file path=ppt/slides/slide6.xml><?xml version="1.0" encoding="utf-8"?>
+<p:sld xmlns:a="http://schemas.openxmlformats.org/drawingml/2006/main" xmlns:r="http://schemas.openxmlformats.org/officeDocument/2006/relationships" xmlns:p="http://schemas.openxmlformats.org/presentationml/2006/main">
+  <p:cSld>
+    <p:spTree>
+      <p:nvGrpSpPr>
+        <p:cNvPr id="1" name=""/>
+        <p:cNvGrpSpPr/>
+        <p:nvPr/>
+      </p:nvGrpSpPr>
+      <p:grpSpPr>
+        <a:xfrm>
+          <a:off x="0" y="0"/>
+          <a:ext cx="0" cy="0"/>
+          <a:chOff x="0" y="0"/>
+          <a:chExt cx="0" cy="0"/>
+        </a:xfrm>
+      </p:grpSpPr>
+      <p:sp>
+        <p:nvSpPr>
+          <p:cNvPr id="2" name="Title 1"/>
+          <p:cNvSpPr>
+            <a:spLocks noGrp="1"/>
+          </p:cNvSpPr>
+          <p:nvPr>
+            <p:ph type="title"/>
+          </p:nvPr>
+        </p:nvSpPr>
+        <p:spPr/>
+        <p:txBody>
+          <a:bodyPr/>
+          <a:lstStyle/>
+          <a:p>
+            <a:pPr marL="0" lvl="0" indent="0">
+              <a:buNone/>
+            </a:pPr>
+            <a:r>
+              <a:rPr dirty="0"/>
+              <a:t>The Second Approach:</a:t>
+            </a:r>
+          </a:p>
+        </p:txBody>
+      </p:sp>
+      <mc:AlternateContent xmlns:mc="http://schemas.openxmlformats.org/markup-compatibility/2006" xmlns:a14="http://schemas.microsoft.com/office/drawing/2010/main">
+        <mc:Choice Requires="a14">
+          <p:sp>
+            <p:nvSpPr>
+              <p:cNvPr id="3" name="Content Placeholder 2"/>
+              <p:cNvSpPr>
+                <a:spLocks noGrp="1"/>
+              </p:cNvSpPr>
+              <p:nvPr>
+                <p:ph idx="1"/>
+              </p:nvPr>
+            </p:nvSpPr>
+            <p:spPr/>
+            <p:txBody>
+              <a:bodyPr>
+                <a:normAutofit/>
+              </a:bodyPr>
+              <a:lstStyle/>
+              <a:p>
+                <a:r>
+                  <a:rPr sz="1600" dirty="0"/>
+                  <a:t>The approach that looks at pairs of successive observations is known as the Mann-Kendall Test</a:t>
+                </a:r>
+                <a:endParaRPr lang="en-US" sz="1600" dirty="0"/>
+              </a:p>
+              <a:p>
+                <a:r>
+                  <a:rPr sz="1600" dirty="0"/>
+                  <a:t>This test looks at all possible pairs of sample data </a:t>
+                </a:r>
+                <a14:m>
+                  <m:oMath xmlns:m="http://schemas.openxmlformats.org/officeDocument/2006/math">
+                    <m:sSub>
+                      <m:sSubPr>
+                        <m:ctrlPr>
+                          <a:rPr sz="1600" i="1">
+                            <a:latin typeface="Cambria Math" panose="02040503050406030204" pitchFamily="18" charset="0"/>
+                          </a:rPr>
+                        </m:ctrlPr>
+                      </m:sSubPr>
+                      <m:e>
+                        <m:r>
+                          <a:rPr sz="1600">
+                            <a:latin typeface="Cambria Math" panose="02040503050406030204" pitchFamily="18" charset="0"/>
+                          </a:rPr>
+                          <m:t>𝑦</m:t>
+                        </m:r>
+                      </m:e>
+                      <m:sub>
+                        <m:r>
+                          <a:rPr sz="1600">
+                            <a:latin typeface="Cambria Math" panose="02040503050406030204" pitchFamily="18" charset="0"/>
+                          </a:rPr>
+                          <m:t>𝑖</m:t>
+                        </m:r>
+                      </m:sub>
+                    </m:sSub>
+                    <m:r>
+                      <a:rPr sz="1600">
+                        <a:latin typeface="Cambria Math" panose="02040503050406030204" pitchFamily="18" charset="0"/>
+                      </a:rPr>
+                      <m:t>,</m:t>
+                    </m:r>
+                    <m:sSub>
+                      <m:sSubPr>
+                        <m:ctrlPr>
+                          <a:rPr sz="1600" i="1">
+                            <a:latin typeface="Cambria Math" panose="02040503050406030204" pitchFamily="18" charset="0"/>
+                          </a:rPr>
+                        </m:ctrlPr>
+                      </m:sSubPr>
+                      <m:e>
+                        <m:r>
+                          <a:rPr sz="1600">
+                            <a:latin typeface="Cambria Math" panose="02040503050406030204" pitchFamily="18" charset="0"/>
+                          </a:rPr>
+                          <m:t>𝑦</m:t>
+                        </m:r>
+                      </m:e>
+                      <m:sub>
+                        <m:r>
+                          <a:rPr sz="1600">
+                            <a:latin typeface="Cambria Math" panose="02040503050406030204" pitchFamily="18" charset="0"/>
+                          </a:rPr>
+                          <m:t>𝑗</m:t>
+                        </m:r>
+                      </m:sub>
+                    </m:sSub>
+                  </m:oMath>
+                </a14:m>
+                <a:r>
+                  <a:rPr sz="1600" dirty="0"/>
+                  <a:t> where </a:t>
+                </a:r>
+                <a14:m>
+                  <m:oMath xmlns:m="http://schemas.openxmlformats.org/officeDocument/2006/math">
+                    <m:r>
+                      <a:rPr sz="1600">
+                        <a:latin typeface="Cambria Math" panose="02040503050406030204" pitchFamily="18" charset="0"/>
+                      </a:rPr>
+                      <m:t>𝑖</m:t>
+                    </m:r>
+                    <m:r>
+                      <a:rPr sz="1600">
+                        <a:latin typeface="Cambria Math" panose="02040503050406030204" pitchFamily="18" charset="0"/>
+                      </a:rPr>
+                      <m:t>&lt;</m:t>
+                    </m:r>
+                    <m:r>
+                      <a:rPr sz="1600">
+                        <a:latin typeface="Cambria Math" panose="02040503050406030204" pitchFamily="18" charset="0"/>
+                      </a:rPr>
+                      <m:t>𝑗</m:t>
+                    </m:r>
+                  </m:oMath>
+                </a14:m>
+                <a:endParaRPr lang="en-US" sz="1600" dirty="0"/>
+              </a:p>
+              <a:p>
+                <a:r>
+                  <a:rPr sz="1600" dirty="0"/>
+                  <a:t>For each pair we calculate </a:t>
+                </a:r>
+                <a14:m>
+                  <m:oMath xmlns:m="http://schemas.openxmlformats.org/officeDocument/2006/math">
+                    <m:r>
+                      <a:rPr sz="1600">
+                        <a:latin typeface="Cambria Math" panose="02040503050406030204" pitchFamily="18" charset="0"/>
+                      </a:rPr>
+                      <m:t>𝑠𝑖𝑔𝑛</m:t>
+                    </m:r>
+                    <m:d>
+                      <m:dPr>
+                        <m:ctrlPr>
+                          <a:rPr sz="1600" i="1">
+                            <a:latin typeface="Cambria Math" panose="02040503050406030204" pitchFamily="18" charset="0"/>
+                          </a:rPr>
+                        </m:ctrlPr>
+                      </m:dPr>
+                      <m:e>
+                        <m:sSub>
+                          <m:sSubPr>
+                            <m:ctrlPr>
+                              <a:rPr sz="1600" i="1">
+                                <a:latin typeface="Cambria Math" panose="02040503050406030204" pitchFamily="18" charset="0"/>
+                              </a:rPr>
+                            </m:ctrlPr>
+                          </m:sSubPr>
+                          <m:e>
+                            <m:r>
+                              <a:rPr sz="1600">
+                                <a:latin typeface="Cambria Math" panose="02040503050406030204" pitchFamily="18" charset="0"/>
+                              </a:rPr>
+                              <m:t>𝑦</m:t>
+                            </m:r>
+                          </m:e>
+                          <m:sub>
+                            <m:r>
+                              <a:rPr sz="1600">
+                                <a:latin typeface="Cambria Math" panose="02040503050406030204" pitchFamily="18" charset="0"/>
+                              </a:rPr>
+                              <m:t>𝑗</m:t>
+                            </m:r>
+                          </m:sub>
+                        </m:sSub>
+                        <m:r>
+                          <a:rPr sz="1600">
+                            <a:latin typeface="Cambria Math" panose="02040503050406030204" pitchFamily="18" charset="0"/>
+                          </a:rPr>
+                          <m:t>−</m:t>
+                        </m:r>
+                        <m:sSub>
+                          <m:sSubPr>
+                            <m:ctrlPr>
+                              <a:rPr sz="1600" i="1">
+                                <a:latin typeface="Cambria Math" panose="02040503050406030204" pitchFamily="18" charset="0"/>
+                              </a:rPr>
+                            </m:ctrlPr>
+                          </m:sSubPr>
+                          <m:e>
+                            <m:r>
+                              <a:rPr sz="1600">
+                                <a:latin typeface="Cambria Math" panose="02040503050406030204" pitchFamily="18" charset="0"/>
+                              </a:rPr>
+                              <m:t>𝑦</m:t>
+                            </m:r>
+                          </m:e>
+                          <m:sub>
+                            <m:r>
+                              <a:rPr sz="1600">
+                                <a:latin typeface="Cambria Math" panose="02040503050406030204" pitchFamily="18" charset="0"/>
+                              </a:rPr>
+                              <m:t>𝑖</m:t>
+                            </m:r>
+                          </m:sub>
+                        </m:sSub>
+                      </m:e>
+                    </m:d>
+                  </m:oMath>
+                </a14:m>
+                <a:r>
+                  <a:rPr sz="1600" dirty="0"/>
+                  <a:t>, where </a:t>
+                </a:r>
+                <a14:m>
+                  <m:oMath xmlns:m="http://schemas.openxmlformats.org/officeDocument/2006/math">
+                    <m:r>
+                      <a:rPr sz="1600">
+                        <a:latin typeface="Cambria Math" panose="02040503050406030204" pitchFamily="18" charset="0"/>
+                      </a:rPr>
+                      <m:t>𝑠𝑖𝑔𝑛</m:t>
+                    </m:r>
+                    <m:d>
+                      <m:dPr>
+                        <m:ctrlPr>
+                          <a:rPr sz="1600" i="1">
+                            <a:latin typeface="Cambria Math" panose="02040503050406030204" pitchFamily="18" charset="0"/>
+                          </a:rPr>
+                        </m:ctrlPr>
+                      </m:dPr>
+                      <m:e>
+                        <m:sSub>
+                          <m:sSubPr>
+                            <m:ctrlPr>
+                              <a:rPr sz="1600" i="1">
+                                <a:latin typeface="Cambria Math" panose="02040503050406030204" pitchFamily="18" charset="0"/>
+                              </a:rPr>
+                            </m:ctrlPr>
+                          </m:sSubPr>
+                          <m:e>
+                            <m:r>
+                              <a:rPr sz="1600">
+                                <a:latin typeface="Cambria Math" panose="02040503050406030204" pitchFamily="18" charset="0"/>
+                              </a:rPr>
+                              <m:t>𝑦</m:t>
+                            </m:r>
+                          </m:e>
+                          <m:sub>
+                            <m:r>
+                              <a:rPr sz="1600">
+                                <a:latin typeface="Cambria Math" panose="02040503050406030204" pitchFamily="18" charset="0"/>
+                              </a:rPr>
+                              <m:t>𝑗</m:t>
+                            </m:r>
+                          </m:sub>
+                        </m:sSub>
+                        <m:r>
+                          <a:rPr sz="1600">
+                            <a:latin typeface="Cambria Math" panose="02040503050406030204" pitchFamily="18" charset="0"/>
+                          </a:rPr>
+                          <m:t>−</m:t>
+                        </m:r>
+                        <m:sSub>
+                          <m:sSubPr>
+                            <m:ctrlPr>
+                              <a:rPr sz="1600" i="1">
+                                <a:latin typeface="Cambria Math" panose="02040503050406030204" pitchFamily="18" charset="0"/>
+                              </a:rPr>
+                            </m:ctrlPr>
+                          </m:sSubPr>
+                          <m:e>
+                            <m:r>
+                              <a:rPr sz="1600">
+                                <a:latin typeface="Cambria Math" panose="02040503050406030204" pitchFamily="18" charset="0"/>
+                              </a:rPr>
+                              <m:t>𝑦</m:t>
+                            </m:r>
+                          </m:e>
+                          <m:sub>
+                            <m:r>
+                              <a:rPr sz="1600">
+                                <a:latin typeface="Cambria Math" panose="02040503050406030204" pitchFamily="18" charset="0"/>
+                              </a:rPr>
+                              <m:t>𝑖</m:t>
+                            </m:r>
+                          </m:sub>
+                        </m:sSub>
+                      </m:e>
+                    </m:d>
+                    <m:r>
+                      <a:rPr sz="1600">
+                        <a:latin typeface="Cambria Math" panose="02040503050406030204" pitchFamily="18" charset="0"/>
+                      </a:rPr>
+                      <m:t>=1</m:t>
+                    </m:r>
+                  </m:oMath>
+                </a14:m>
+                <a:r>
+                  <a:rPr sz="1600" dirty="0"/>
+                  <a:t> if </a:t>
+                </a:r>
+                <a14:m>
+                  <m:oMath xmlns:m="http://schemas.openxmlformats.org/officeDocument/2006/math">
+                    <m:sSub>
+                      <m:sSubPr>
+                        <m:ctrlPr>
+                          <a:rPr sz="1600" i="1">
+                            <a:latin typeface="Cambria Math" panose="02040503050406030204" pitchFamily="18" charset="0"/>
+                          </a:rPr>
+                        </m:ctrlPr>
+                      </m:sSubPr>
+                      <m:e>
+                        <m:r>
+                          <a:rPr sz="1600">
+                            <a:latin typeface="Cambria Math" panose="02040503050406030204" pitchFamily="18" charset="0"/>
+                          </a:rPr>
+                          <m:t>𝑦</m:t>
+                        </m:r>
+                      </m:e>
+                      <m:sub>
+                        <m:r>
+                          <a:rPr sz="1600">
+                            <a:latin typeface="Cambria Math" panose="02040503050406030204" pitchFamily="18" charset="0"/>
+                          </a:rPr>
+                          <m:t>𝑗</m:t>
+                        </m:r>
+                      </m:sub>
+                    </m:sSub>
+                    <m:r>
+                      <a:rPr sz="1600">
+                        <a:latin typeface="Cambria Math" panose="02040503050406030204" pitchFamily="18" charset="0"/>
+                      </a:rPr>
+                      <m:t>&gt;</m:t>
+                    </m:r>
+                    <m:sSub>
+                      <m:sSubPr>
+                        <m:ctrlPr>
+                          <a:rPr sz="1600" i="1">
+                            <a:latin typeface="Cambria Math" panose="02040503050406030204" pitchFamily="18" charset="0"/>
+                          </a:rPr>
+                        </m:ctrlPr>
+                      </m:sSubPr>
+                      <m:e>
+                        <m:r>
+                          <a:rPr sz="1600">
+                            <a:latin typeface="Cambria Math" panose="02040503050406030204" pitchFamily="18" charset="0"/>
+                          </a:rPr>
+                          <m:t>𝑦</m:t>
+                        </m:r>
+                      </m:e>
+                      <m:sub>
+                        <m:r>
+                          <a:rPr sz="1600">
+                            <a:latin typeface="Cambria Math" panose="02040503050406030204" pitchFamily="18" charset="0"/>
+                          </a:rPr>
+                          <m:t>𝑖</m:t>
+                        </m:r>
+                      </m:sub>
+                    </m:sSub>
+                  </m:oMath>
+                </a14:m>
+                <a:r>
+                  <a:rPr sz="1600" dirty="0"/>
+                  <a:t>, </a:t>
+                </a:r>
+                <a14:m>
+                  <m:oMath xmlns:m="http://schemas.openxmlformats.org/officeDocument/2006/math">
+                    <m:r>
+                      <a:rPr sz="1600">
+                        <a:latin typeface="Cambria Math" panose="02040503050406030204" pitchFamily="18" charset="0"/>
+                      </a:rPr>
+                      <m:t>0</m:t>
+                    </m:r>
+                  </m:oMath>
+                </a14:m>
+                <a:r>
+                  <a:rPr sz="1600" dirty="0"/>
+                  <a:t> if </a:t>
+                </a:r>
+                <a14:m>
+                  <m:oMath xmlns:m="http://schemas.openxmlformats.org/officeDocument/2006/math">
+                    <m:sSub>
+                      <m:sSubPr>
+                        <m:ctrlPr>
+                          <a:rPr sz="1600" i="1">
+                            <a:latin typeface="Cambria Math" panose="02040503050406030204" pitchFamily="18" charset="0"/>
+                          </a:rPr>
+                        </m:ctrlPr>
+                      </m:sSubPr>
+                      <m:e>
+                        <m:r>
+                          <a:rPr sz="1600">
+                            <a:latin typeface="Cambria Math" panose="02040503050406030204" pitchFamily="18" charset="0"/>
+                          </a:rPr>
+                          <m:t>𝑦</m:t>
+                        </m:r>
+                      </m:e>
+                      <m:sub>
+                        <m:r>
+                          <a:rPr sz="1600">
+                            <a:latin typeface="Cambria Math" panose="02040503050406030204" pitchFamily="18" charset="0"/>
+                          </a:rPr>
+                          <m:t>𝑗</m:t>
+                        </m:r>
+                      </m:sub>
+                    </m:sSub>
+                    <m:r>
+                      <a:rPr sz="1600">
+                        <a:latin typeface="Cambria Math" panose="02040503050406030204" pitchFamily="18" charset="0"/>
+                      </a:rPr>
+                      <m:t>=</m:t>
+                    </m:r>
+                    <m:sSub>
+                      <m:sSubPr>
+                        <m:ctrlPr>
+                          <a:rPr sz="1600" i="1">
+                            <a:latin typeface="Cambria Math" panose="02040503050406030204" pitchFamily="18" charset="0"/>
+                          </a:rPr>
+                        </m:ctrlPr>
+                      </m:sSubPr>
+                      <m:e>
+                        <m:r>
+                          <a:rPr sz="1600">
+                            <a:latin typeface="Cambria Math" panose="02040503050406030204" pitchFamily="18" charset="0"/>
+                          </a:rPr>
+                          <m:t>𝑦</m:t>
+                        </m:r>
+                      </m:e>
+                      <m:sub>
+                        <m:r>
+                          <a:rPr sz="1600">
+                            <a:latin typeface="Cambria Math" panose="02040503050406030204" pitchFamily="18" charset="0"/>
+                          </a:rPr>
+                          <m:t>𝑖</m:t>
+                        </m:r>
+                      </m:sub>
+                    </m:sSub>
+                  </m:oMath>
+                </a14:m>
+                <a:r>
+                  <a:rPr sz="1600" dirty="0"/>
+                  <a:t> and </a:t>
+                </a:r>
+                <a14:m>
+                  <m:oMath xmlns:m="http://schemas.openxmlformats.org/officeDocument/2006/math">
+                    <m:r>
+                      <a:rPr sz="1600">
+                        <a:latin typeface="Cambria Math" panose="02040503050406030204" pitchFamily="18" charset="0"/>
+                      </a:rPr>
+                      <m:t>−1</m:t>
+                    </m:r>
+                  </m:oMath>
+                </a14:m>
+                <a:r>
+                  <a:rPr sz="1600" dirty="0"/>
+                  <a:t> if </a:t>
+                </a:r>
+                <a14:m>
+                  <m:oMath xmlns:m="http://schemas.openxmlformats.org/officeDocument/2006/math">
+                    <m:sSub>
+                      <m:sSubPr>
+                        <m:ctrlPr>
+                          <a:rPr sz="1600" i="1">
+                            <a:latin typeface="Cambria Math" panose="02040503050406030204" pitchFamily="18" charset="0"/>
+                          </a:rPr>
+                        </m:ctrlPr>
+                      </m:sSubPr>
+                      <m:e>
+                        <m:r>
+                          <a:rPr sz="1600">
+                            <a:latin typeface="Cambria Math" panose="02040503050406030204" pitchFamily="18" charset="0"/>
+                          </a:rPr>
+                          <m:t>𝑦</m:t>
+                        </m:r>
+                      </m:e>
+                      <m:sub>
+                        <m:r>
+                          <a:rPr sz="1600">
+                            <a:latin typeface="Cambria Math" panose="02040503050406030204" pitchFamily="18" charset="0"/>
+                          </a:rPr>
+                          <m:t>𝑗</m:t>
+                        </m:r>
+                      </m:sub>
+                    </m:sSub>
+                    <m:r>
+                      <a:rPr sz="1600">
+                        <a:latin typeface="Cambria Math" panose="02040503050406030204" pitchFamily="18" charset="0"/>
+                      </a:rPr>
+                      <m:t>&lt;</m:t>
+                    </m:r>
+                    <m:sSub>
+                      <m:sSubPr>
+                        <m:ctrlPr>
+                          <a:rPr sz="1600" i="1">
+                            <a:latin typeface="Cambria Math" panose="02040503050406030204" pitchFamily="18" charset="0"/>
+                          </a:rPr>
+                        </m:ctrlPr>
+                      </m:sSubPr>
+                      <m:e>
+                        <m:r>
+                          <a:rPr sz="1600">
+                            <a:latin typeface="Cambria Math" panose="02040503050406030204" pitchFamily="18" charset="0"/>
+                          </a:rPr>
+                          <m:t>𝑦</m:t>
+                        </m:r>
+                      </m:e>
+                      <m:sub>
+                        <m:r>
+                          <a:rPr sz="1600">
+                            <a:latin typeface="Cambria Math" panose="02040503050406030204" pitchFamily="18" charset="0"/>
+                          </a:rPr>
+                          <m:t>𝑖</m:t>
+                        </m:r>
+                      </m:sub>
+                    </m:sSub>
+                  </m:oMath>
+                </a14:m>
+                <a:endParaRPr lang="en-US" sz="1600" dirty="0"/>
+              </a:p>
+              <a:p>
+                <a:r>
+                  <a:rPr sz="1600" dirty="0"/>
+                  <a:t>We take the average of these values </a:t>
+                </a:r>
+                <a:endParaRPr lang="en-US" sz="1600" dirty="0"/>
+              </a:p>
+              <a:p>
+                <a:r>
+                  <a:rPr sz="1600" dirty="0"/>
+                  <a:t>This average is a value between </a:t>
+                </a:r>
+                <a14:m>
+                  <m:oMath xmlns:m="http://schemas.openxmlformats.org/officeDocument/2006/math">
+                    <m:r>
+                      <a:rPr sz="1600">
+                        <a:latin typeface="Cambria Math" panose="02040503050406030204" pitchFamily="18" charset="0"/>
+                      </a:rPr>
+                      <m:t>−1</m:t>
+                    </m:r>
+                  </m:oMath>
+                </a14:m>
+                <a:r>
+                  <a:rPr sz="1600" dirty="0"/>
+                  <a:t> and </a:t>
+                </a:r>
+                <a14:m>
+                  <m:oMath xmlns:m="http://schemas.openxmlformats.org/officeDocument/2006/math">
+                    <m:r>
+                      <a:rPr sz="1600">
+                        <a:latin typeface="Cambria Math" panose="02040503050406030204" pitchFamily="18" charset="0"/>
+                      </a:rPr>
+                      <m:t>1</m:t>
+                    </m:r>
+                  </m:oMath>
+                </a14:m>
+                <a:r>
+                  <a:rPr sz="1600" dirty="0"/>
+                  <a:t> and is known as Kendall’s Tau </a:t>
+                </a:r>
+                <a:endParaRPr lang="en-US" sz="1600" dirty="0"/>
+              </a:p>
+              <a:p>
+                <a:r>
+                  <a:rPr sz="1600" dirty="0"/>
+                  <a:t>If Kendall’s Tau is positive this means that more of the pairs increase over time than decrease</a:t>
+                </a:r>
+              </a:p>
+            </p:txBody>
+          </p:sp>
+        </mc:Choice>
+        <mc:Fallback xmlns="">
+          <p:sp>
+            <p:nvSpPr>
+              <p:cNvPr id="3" name="Content Placeholder 2"/>
+              <p:cNvSpPr>
+                <a:spLocks noGrp="1" noRot="1" noChangeAspect="1" noMove="1" noResize="1" noEditPoints="1" noAdjustHandles="1" noChangeArrowheads="1" noChangeShapeType="1" noTextEdit="1"/>
+              </p:cNvSpPr>
+              <p:nvPr>
+                <p:ph idx="1"/>
+              </p:nvPr>
+            </p:nvSpPr>
+            <p:spPr>
+              <a:blipFill>
+                <a:blip r:embed="rId2"/>
+                <a:stretch>
+                  <a:fillRect l="-309" t="-373"/>
+                </a:stretch>
+              </a:blipFill>
+            </p:spPr>
+            <p:txBody>
+              <a:bodyPr/>
+              <a:lstStyle/>
+              <a:p>
+                <a:r>
+                  <a:rPr lang="en-US">
+                    <a:noFill/>
+                  </a:rPr>
+                  <a:t> </a:t>
+                </a:r>
+              </a:p>
+            </p:txBody>
+          </p:sp>
+        </mc:Fallback>
+      </mc:AlternateContent>
+    </p:spTree>
+  </p:cSld>
+  <p:clrMapOvr>
+    <a:masterClrMapping/>
+  </p:clrMapOvr>
+</p:sld>
+</file>
+
+<file path=ppt/slides/slide7.xml><?xml version="1.0" encoding="utf-8"?>
+<p:sld xmlns:a="http://schemas.openxmlformats.org/drawingml/2006/main" xmlns:r="http://schemas.openxmlformats.org/officeDocument/2006/relationships" xmlns:p="http://schemas.openxmlformats.org/presentationml/2006/main">
+  <p:cSld>
+    <p:spTree>
+      <p:nvGrpSpPr>
+        <p:cNvPr id="1" name=""/>
+        <p:cNvGrpSpPr/>
+        <p:nvPr/>
+      </p:nvGrpSpPr>
+      <p:grpSpPr>
+        <a:xfrm>
+          <a:off x="0" y="0"/>
+          <a:ext cx="0" cy="0"/>
+          <a:chOff x="0" y="0"/>
+          <a:chExt cx="0" cy="0"/>
+        </a:xfrm>
+      </p:grpSpPr>
+      <p:sp>
+        <p:nvSpPr>
+          <p:cNvPr id="2" name="Title 1"/>
+          <p:cNvSpPr>
+            <a:spLocks noGrp="1"/>
+          </p:cNvSpPr>
+          <p:nvPr>
+            <p:ph type="title"/>
+          </p:nvPr>
+        </p:nvSpPr>
+        <p:spPr/>
+        <p:txBody>
+          <a:bodyPr/>
+          <a:lstStyle/>
+          <a:p>
+            <a:pPr marL="0" lvl="0" indent="0">
+              <a:buNone/>
+            </a:pPr>
+            <a:r>
+              <a:rPr dirty="0"/>
+              <a:t>The Mann-Kendall Test:</a:t>
+            </a:r>
+          </a:p>
+        </p:txBody>
+      </p:sp>
+      <p:sp>
+        <p:nvSpPr>
+          <p:cNvPr id="3" name="Content Placeholder 2"/>
+          <p:cNvSpPr>
+            <a:spLocks noGrp="1"/>
+          </p:cNvSpPr>
+          <p:nvPr>
+            <p:ph idx="1"/>
+          </p:nvPr>
+        </p:nvSpPr>
+        <p:spPr/>
+        <p:txBody>
+          <a:bodyPr>
+            <a:normAutofit/>
+          </a:bodyPr>
+          <a:lstStyle/>
+          <a:p>
+            <a:r>
+              <a:rPr sz="1600" dirty="0"/>
+              <a:t>Null Hypothesis: Observations are equally likely to increase or decrease over time (no trend) </a:t>
+            </a:r>
+            <a:endParaRPr lang="en-US" sz="1600" dirty="0"/>
+          </a:p>
+          <a:p>
+            <a:r>
+              <a:rPr sz="1600" dirty="0"/>
+              <a:t>Alternative Hypothesis: Observations are more likely to increase than decrease over time (positive trend) </a:t>
+            </a:r>
+            <a:endParaRPr lang="en-US" sz="1600" dirty="0"/>
+          </a:p>
+          <a:p>
+            <a:r>
+              <a:rPr sz="1600" dirty="0"/>
+              <a:t>The Mann-Kendall Test tells us if Kendall’s Tau is different enough from zero to conclude there is a trend </a:t>
+            </a:r>
+            <a:endParaRPr lang="en-US" sz="1600" dirty="0"/>
+          </a:p>
+          <a:p>
+            <a:r>
+              <a:rPr sz="1600" dirty="0"/>
+              <a:t>If the null hypothesis is true then (the sample) Kendall’s Tau is approximately normal (for large enough sample sizes) with an expected value of zero </a:t>
+            </a:r>
+            <a:endParaRPr lang="en-US" sz="1600" dirty="0"/>
+          </a:p>
+          <a:p>
+            <a:r>
+              <a:rPr sz="1600" dirty="0"/>
+              <a:t>Hypothesis test is constructed using the approximate normality of Kendall’s Tau </a:t>
+            </a:r>
+            <a:endParaRPr lang="en-US" sz="1600" dirty="0"/>
+          </a:p>
+          <a:p>
+            <a:r>
+              <a:rPr sz="1600" dirty="0"/>
+              <a:t>The approximate normality of Kendall’s Tau holds regardless of whether the data is normal </a:t>
+            </a:r>
+            <a:endParaRPr lang="en-US" sz="1600" dirty="0"/>
+          </a:p>
+          <a:p>
+            <a:r>
+              <a:rPr sz="1600" dirty="0"/>
+              <a:t>Mann-Kendall test makes no assumption that the relationship between x and y is linear</a:t>
+            </a:r>
+            <a:endParaRPr lang="en-US" sz="1600" dirty="0"/>
+          </a:p>
+          <a:p>
+            <a:r>
+              <a:rPr sz="1600" dirty="0"/>
+              <a:t>Only depends on the ranks of the observations</a:t>
+            </a:r>
+          </a:p>
+        </p:txBody>
+      </p:sp>
+    </p:spTree>
+  </p:cSld>
+  <p:clrMapOvr>
+    <a:masterClrMapping/>
+  </p:clrMapOvr>
+</p:sld>
+</file>
+
+<file path=ppt/slides/slide8.xml><?xml version="1.0" encoding="utf-8"?>
+<p:sld xmlns:a="http://schemas.openxmlformats.org/drawingml/2006/main" xmlns:r="http://schemas.openxmlformats.org/officeDocument/2006/relationships" xmlns:p="http://schemas.openxmlformats.org/presentationml/2006/main">
+  <p:cSld>
+    <p:spTree>
+      <p:nvGrpSpPr>
+        <p:cNvPr id="1" name=""/>
+        <p:cNvGrpSpPr/>
+        <p:nvPr/>
+      </p:nvGrpSpPr>
+      <p:grpSpPr>
+        <a:xfrm>
+          <a:off x="0" y="0"/>
+          <a:ext cx="0" cy="0"/>
+          <a:chOff x="0" y="0"/>
+          <a:chExt cx="0" cy="0"/>
+        </a:xfrm>
+      </p:grpSpPr>
+      <p:sp>
+        <p:nvSpPr>
+          <p:cNvPr id="2" name="Title 1"/>
+          <p:cNvSpPr>
+            <a:spLocks noGrp="1"/>
+          </p:cNvSpPr>
+          <p:nvPr>
+            <p:ph type="title"/>
+          </p:nvPr>
+        </p:nvSpPr>
+        <p:spPr/>
+        <p:txBody>
+          <a:bodyPr/>
+          <a:lstStyle/>
+          <a:p>
+            <a:pPr marL="0" lvl="0" indent="0">
+              <a:buNone/>
+            </a:pPr>
+            <a:r>
+              <a:rPr dirty="0"/>
+              <a:t>Issues with the Mann-Kendall Test:</a:t>
+            </a:r>
+          </a:p>
+        </p:txBody>
+      </p:sp>
+      <p:sp>
+        <p:nvSpPr>
+          <p:cNvPr id="3" name="Content Placeholder 2"/>
+          <p:cNvSpPr>
+            <a:spLocks noGrp="1"/>
+          </p:cNvSpPr>
+          <p:nvPr>
+            <p:ph idx="1"/>
+          </p:nvPr>
+        </p:nvSpPr>
+        <p:spPr/>
+        <p:txBody>
+          <a:bodyPr>
+            <a:normAutofit/>
+          </a:bodyPr>
+          <a:lstStyle/>
+          <a:p>
+            <a:pPr marL="0" lvl="0" indent="0">
+              <a:buNone/>
+            </a:pPr>
+            <a:r>
+              <a:rPr sz="1600" dirty="0"/>
+              <a:t>Seasonal/Regional effects:</a:t>
+            </a:r>
+          </a:p>
+          <a:p>
+            <a:r>
+              <a:rPr sz="1600" dirty="0"/>
+              <a:t>While the MK test can deal with non-normal and non-linear data it is not designed to deal with seasonal or regional effects </a:t>
+            </a:r>
+            <a:endParaRPr lang="en-US" sz="1600" dirty="0"/>
+          </a:p>
+          <a:p>
+            <a:r>
+              <a:rPr sz="1600" dirty="0"/>
+              <a:t>This can lead to misleading results </a:t>
+            </a:r>
+            <a:endParaRPr lang="en-US" sz="1600" dirty="0"/>
+          </a:p>
+          <a:p>
+            <a:r>
+              <a:rPr sz="1600" dirty="0"/>
+              <a:t>When observations are compared across seasons or regions seasonal </a:t>
+            </a:r>
+            <a:r>
+              <a:rPr lang="en-US" sz="1600" dirty="0"/>
+              <a:t>and</a:t>
+            </a:r>
+            <a:r>
+              <a:rPr sz="1600" dirty="0"/>
+              <a:t> regional differences can be mistaken for trend</a:t>
+            </a:r>
+          </a:p>
+          <a:p>
+            <a:pPr marL="0" lvl="0" indent="0">
+              <a:buNone/>
+            </a:pPr>
+            <a:r>
+              <a:rPr sz="1600" dirty="0"/>
+              <a:t>Spatial/Temporal dependence:</a:t>
+            </a:r>
+          </a:p>
+          <a:p>
+            <a:r>
+              <a:rPr sz="1600" dirty="0"/>
+              <a:t>MK test also assumes that observations are independent </a:t>
+            </a:r>
+            <a:endParaRPr lang="en-US" sz="1600" dirty="0"/>
+          </a:p>
+          <a:p>
+            <a:r>
+              <a:rPr sz="1600" dirty="0"/>
+              <a:t>This is often an unrealistic assumption </a:t>
+            </a:r>
+            <a:endParaRPr lang="en-US" sz="1600" dirty="0"/>
+          </a:p>
+          <a:p>
+            <a:r>
+              <a:rPr sz="1600" dirty="0"/>
+              <a:t>It is natural for observations close in space and time to have some type of dependence</a:t>
+            </a:r>
+          </a:p>
+        </p:txBody>
+      </p:sp>
+    </p:spTree>
+  </p:cSld>
+  <p:clrMapOvr>
+    <a:masterClrMapping/>
+  </p:clrMapOvr>
+</p:sld>
+</file>
+
+<file path=ppt/slides/slide9.xml><?xml version="1.0" encoding="utf-8"?>
+<p:sld xmlns:a="http://schemas.openxmlformats.org/drawingml/2006/main" xmlns:r="http://schemas.openxmlformats.org/officeDocument/2006/relationships" xmlns:p="http://schemas.openxmlformats.org/presentationml/2006/main">
+  <p:cSld>
+    <p:spTree>
+      <p:nvGrpSpPr>
+        <p:cNvPr id="1" name=""/>
+        <p:cNvGrpSpPr/>
+        <p:nvPr/>
+      </p:nvGrpSpPr>
+      <p:grpSpPr>
+        <a:xfrm>
+          <a:off x="0" y="0"/>
+          <a:ext cx="0" cy="0"/>
+          <a:chOff x="0" y="0"/>
+          <a:chExt cx="0" cy="0"/>
+        </a:xfrm>
+      </p:grpSpPr>
+      <p:sp>
+        <p:nvSpPr>
+          <p:cNvPr id="2" name="Title 1"/>
+          <p:cNvSpPr>
+            <a:spLocks noGrp="1"/>
+          </p:cNvSpPr>
+          <p:nvPr>
+            <p:ph type="title"/>
+          </p:nvPr>
+        </p:nvSpPr>
+        <p:spPr/>
+        <p:txBody>
+          <a:bodyPr/>
+          <a:lstStyle/>
+          <a:p>
+            <a:pPr marL="0" lvl="0" indent="0">
+              <a:buNone/>
+            </a:pPr>
+            <a:r>
+              <a:rPr dirty="0"/>
+              <a:t>Dealing with Seasonal/Regional Effects:</a:t>
+            </a:r>
+          </a:p>
+        </p:txBody>
+      </p:sp>
+      <p:sp>
+        <p:nvSpPr>
+          <p:cNvPr id="3" name="Content Placeholder 2"/>
+          <p:cNvSpPr>
+            <a:spLocks noGrp="1"/>
+          </p:cNvSpPr>
+          <p:nvPr>
+            <p:ph idx="1"/>
+          </p:nvPr>
+        </p:nvSpPr>
+        <p:spPr/>
+        <p:txBody>
+          <a:bodyPr>
+            <a:normAutofit/>
+          </a:bodyPr>
+          <a:lstStyle/>
+          <a:p>
+            <a:r>
+              <a:rPr sz="1600" dirty="0"/>
+              <a:t>Fortunately there are seasonal and regional versions of the MK test </a:t>
+            </a:r>
+            <a:endParaRPr lang="en-US" sz="1600" dirty="0"/>
+          </a:p>
+          <a:p>
+            <a:r>
+              <a:rPr sz="1600" dirty="0"/>
+              <a:t>Rather than looking at all pairs of sample data we can only look at pairs within the same season and region </a:t>
+            </a:r>
+            <a:endParaRPr lang="en-US" sz="1600" dirty="0"/>
+          </a:p>
+          <a:p>
+            <a:r>
+              <a:rPr sz="1600" dirty="0"/>
+              <a:t>This is </a:t>
+            </a:r>
+            <a:r>
+              <a:rPr lang="en-US" sz="1600" dirty="0"/>
+              <a:t>k</a:t>
+            </a:r>
+            <a:r>
+              <a:rPr sz="1600" dirty="0"/>
+              <a:t>nown as a Regional-Seasonal Kendall test </a:t>
+            </a:r>
+            <a:endParaRPr lang="en-US" sz="1600" dirty="0"/>
+          </a:p>
+          <a:p>
+            <a:r>
+              <a:rPr sz="1600" dirty="0"/>
+              <a:t>We only compare pairs within each Region-Season combination </a:t>
+            </a:r>
+            <a:endParaRPr lang="en-US" sz="1600" dirty="0"/>
+          </a:p>
+          <a:p>
+            <a:r>
+              <a:rPr sz="1600" dirty="0"/>
+              <a:t>These pairwise comparisons are then </a:t>
+            </a:r>
+            <a:r>
+              <a:rPr lang="en-US" sz="1600" dirty="0"/>
+              <a:t>put together and </a:t>
+            </a:r>
+            <a:r>
+              <a:rPr sz="1600" dirty="0"/>
+              <a:t>averaged like before to calculate Kendall’s Tau </a:t>
+            </a:r>
+            <a:endParaRPr lang="en-US" sz="1600" dirty="0"/>
+          </a:p>
+          <a:p>
+            <a:r>
+              <a:rPr sz="1600" dirty="0"/>
+              <a:t>A positive R-S </a:t>
+            </a:r>
+            <a:r>
+              <a:rPr lang="en-US" sz="1600" dirty="0"/>
+              <a:t>Kendall’s </a:t>
+            </a:r>
+            <a:r>
+              <a:rPr sz="1600" dirty="0"/>
+              <a:t>Tau tells us that there is an increasing trend in one or more Region-Season combination</a:t>
+            </a:r>
+          </a:p>
+        </p:txBody>
+      </p:sp>
+    </p:spTree>
+  </p:cSld>
+  <p:clrMapOvr>
+    <a:masterClrMapping/>
+  </p:clrMapOvr>
 </p:sld>
 </file>
 
@@ -3864,265 +6758,4 @@
   </a:objectDefaults>
   <a:extraClrSchemeLst/>
 </a:theme>
-</file>
-
-<file path=ppt/theme/theme2.xml><?xml version="1.0" encoding="utf-8"?>
-<a:theme xmlns:a="http://schemas.openxmlformats.org/drawingml/2006/main" name="Office Theme">
-  <a:themeElements>
-    <a:clrScheme name="Office">
-      <a:dk1>
-        <a:sysClr val="windowText" lastClr="000000"/>
-      </a:dk1>
-      <a:lt1>
-        <a:sysClr val="window" lastClr="FFFFFF"/>
-      </a:lt1>
-      <a:dk2>
-        <a:srgbClr val="44546A"/>
-      </a:dk2>
-      <a:lt2>
-        <a:srgbClr val="E7E6E6"/>
-      </a:lt2>
-      <a:accent1>
-        <a:srgbClr val="5B9BD5"/>
-      </a:accent1>
-      <a:accent2>
-        <a:srgbClr val="ED7D31"/>
-      </a:accent2>
-      <a:accent3>
-        <a:srgbClr val="A5A5A5"/>
-      </a:accent3>
-      <a:accent4>
-        <a:srgbClr val="FFC000"/>
-      </a:accent4>
-      <a:accent5>
-        <a:srgbClr val="4472C4"/>
-      </a:accent5>
-      <a:accent6>
-        <a:srgbClr val="70AD47"/>
-      </a:accent6>
-      <a:hlink>
-        <a:srgbClr val="0563C1"/>
-      </a:hlink>
-      <a:folHlink>
-        <a:srgbClr val="954F72"/>
-      </a:folHlink>
-    </a:clrScheme>
-    <a:fontScheme name="Office">
-      <a:majorFont>
-        <a:latin typeface="Calibri Light" panose="020F0302020204030204"/>
-        <a:ea typeface=""/>
-        <a:cs typeface=""/>
-        <a:font script="Jpan" typeface="ＭＳ Ｐゴシック"/>
-        <a:font script="Hang" typeface="맑은 고딕"/>
-        <a:font script="Hans" typeface="宋体"/>
-        <a:font script="Hant" typeface="新細明體"/>
-        <a:font script="Arab" typeface="Times New Roman"/>
-        <a:font script="Hebr" typeface="Times New Roman"/>
-        <a:font script="Thai" typeface="Angsana New"/>
-        <a:font script="Ethi" typeface="Nyala"/>
-        <a:font script="Beng" typeface="Vrinda"/>
-        <a:font script="Gujr" typeface="Shruti"/>
-        <a:font script="Khmr" typeface="MoolBoran"/>
-        <a:font script="Knda" typeface="Tunga"/>
-        <a:font script="Guru" typeface="Raavi"/>
-        <a:font script="Cans" typeface="Euphemia"/>
-        <a:font script="Cher" typeface="Plantagenet Cherokee"/>
-        <a:font script="Yiii" typeface="Microsoft Yi Baiti"/>
-        <a:font script="Tibt" typeface="Microsoft Himalaya"/>
-        <a:font script="Thaa" typeface="MV Boli"/>
-        <a:font script="Deva" typeface="Mangal"/>
-        <a:font script="Telu" typeface="Gautami"/>
-        <a:font script="Taml" typeface="Latha"/>
-        <a:font script="Syrc" typeface="Estrangelo Edessa"/>
-        <a:font script="Orya" typeface="Kalinga"/>
-        <a:font script="Mlym" typeface="Kartika"/>
-        <a:font script="Laoo" typeface="DokChampa"/>
-        <a:font script="Sinh" typeface="Iskoola Pota"/>
-        <a:font script="Mong" typeface="Mongolian Baiti"/>
-        <a:font script="Viet" typeface="Times New Roman"/>
-        <a:font script="Uigh" typeface="Microsoft Uighur"/>
-        <a:font script="Geor" typeface="Sylfaen"/>
-      </a:majorFont>
-      <a:minorFont>
-        <a:latin typeface="Calibri" panose="020F0502020204030204"/>
-        <a:ea typeface=""/>
-        <a:cs typeface=""/>
-        <a:font script="Jpan" typeface="ＭＳ Ｐゴシック"/>
-        <a:font script="Hang" typeface="맑은 고딕"/>
-        <a:font script="Hans" typeface="宋体"/>
-        <a:font script="Hant" typeface="新細明體"/>
-        <a:font script="Arab" typeface="Arial"/>
-        <a:font script="Hebr" typeface="Arial"/>
-        <a:font script="Thai" typeface="Cordia New"/>
-        <a:font script="Ethi" typeface="Nyala"/>
-        <a:font script="Beng" typeface="Vrinda"/>
-        <a:font script="Gujr" typeface="Shruti"/>
-        <a:font script="Khmr" typeface="DaunPenh"/>
-        <a:font script="Knda" typeface="Tunga"/>
-        <a:font script="Guru" typeface="Raavi"/>
-        <a:font script="Cans" typeface="Euphemia"/>
-        <a:font script="Cher" typeface="Plantagenet Cherokee"/>
-        <a:font script="Yiii" typeface="Microsoft Yi Baiti"/>
-        <a:font script="Tibt" typeface="Microsoft Himalaya"/>
-        <a:font script="Thaa" typeface="MV Boli"/>
-        <a:font script="Deva" typeface="Mangal"/>
-        <a:font script="Telu" typeface="Gautami"/>
-        <a:font script="Taml" typeface="Latha"/>
-        <a:font script="Syrc" typeface="Estrangelo Edessa"/>
-        <a:font script="Orya" typeface="Kalinga"/>
-        <a:font script="Mlym" typeface="Kartika"/>
-        <a:font script="Laoo" typeface="DokChampa"/>
-        <a:font script="Sinh" typeface="Iskoola Pota"/>
-        <a:font script="Mong" typeface="Mongolian Baiti"/>
-        <a:font script="Viet" typeface="Arial"/>
-        <a:font script="Uigh" typeface="Microsoft Uighur"/>
-        <a:font script="Geor" typeface="Sylfaen"/>
-      </a:minorFont>
-    </a:fontScheme>
-    <a:fmtScheme name="Office">
-      <a:fillStyleLst>
-        <a:solidFill>
-          <a:schemeClr val="phClr"/>
-        </a:solidFill>
-        <a:gradFill rotWithShape="1">
-          <a:gsLst>
-            <a:gs pos="0">
-              <a:schemeClr val="phClr">
-                <a:lumMod val="110000"/>
-                <a:satMod val="105000"/>
-                <a:tint val="67000"/>
-              </a:schemeClr>
-            </a:gs>
-            <a:gs pos="50000">
-              <a:schemeClr val="phClr">
-                <a:lumMod val="105000"/>
-                <a:satMod val="103000"/>
-                <a:tint val="73000"/>
-              </a:schemeClr>
-            </a:gs>
-            <a:gs pos="100000">
-              <a:schemeClr val="phClr">
-                <a:lumMod val="105000"/>
-                <a:satMod val="109000"/>
-                <a:tint val="81000"/>
-              </a:schemeClr>
-            </a:gs>
-          </a:gsLst>
-          <a:lin ang="5400000" scaled="0"/>
-        </a:gradFill>
-        <a:gradFill rotWithShape="1">
-          <a:gsLst>
-            <a:gs pos="0">
-              <a:schemeClr val="phClr">
-                <a:satMod val="103000"/>
-                <a:lumMod val="102000"/>
-                <a:tint val="94000"/>
-              </a:schemeClr>
-            </a:gs>
-            <a:gs pos="50000">
-              <a:schemeClr val="phClr">
-                <a:satMod val="110000"/>
-                <a:lumMod val="100000"/>
-                <a:shade val="100000"/>
-              </a:schemeClr>
-            </a:gs>
-            <a:gs pos="100000">
-              <a:schemeClr val="phClr">
-                <a:lumMod val="99000"/>
-                <a:satMod val="120000"/>
-                <a:shade val="78000"/>
-              </a:schemeClr>
-            </a:gs>
-          </a:gsLst>
-          <a:lin ang="5400000" scaled="0"/>
-        </a:gradFill>
-      </a:fillStyleLst>
-      <a:lnStyleLst>
-        <a:ln w="6350" cap="flat" cmpd="sng" algn="ctr">
-          <a:solidFill>
-            <a:schemeClr val="phClr"/>
-          </a:solidFill>
-          <a:prstDash val="solid"/>
-          <a:miter lim="800000"/>
-        </a:ln>
-        <a:ln w="12700" cap="flat" cmpd="sng" algn="ctr">
-          <a:solidFill>
-            <a:schemeClr val="phClr"/>
-          </a:solidFill>
-          <a:prstDash val="solid"/>
-          <a:miter lim="800000"/>
-        </a:ln>
-        <a:ln w="19050" cap="flat" cmpd="sng" algn="ctr">
-          <a:solidFill>
-            <a:schemeClr val="phClr"/>
-          </a:solidFill>
-          <a:prstDash val="solid"/>
-          <a:miter lim="800000"/>
-        </a:ln>
-      </a:lnStyleLst>
-      <a:effectStyleLst>
-        <a:effectStyle>
-          <a:effectLst/>
-        </a:effectStyle>
-        <a:effectStyle>
-          <a:effectLst/>
-        </a:effectStyle>
-        <a:effectStyle>
-          <a:effectLst>
-            <a:outerShdw blurRad="57150" dist="19050" dir="5400000" algn="ctr" rotWithShape="0">
-              <a:srgbClr val="000000">
-                <a:alpha val="63000"/>
-              </a:srgbClr>
-            </a:outerShdw>
-          </a:effectLst>
-        </a:effectStyle>
-      </a:effectStyleLst>
-      <a:bgFillStyleLst>
-        <a:solidFill>
-          <a:schemeClr val="phClr"/>
-        </a:solidFill>
-        <a:solidFill>
-          <a:schemeClr val="phClr">
-            <a:tint val="95000"/>
-            <a:satMod val="170000"/>
-          </a:schemeClr>
-        </a:solidFill>
-        <a:gradFill rotWithShape="1">
-          <a:gsLst>
-            <a:gs pos="0">
-              <a:schemeClr val="phClr">
-                <a:tint val="93000"/>
-                <a:satMod val="150000"/>
-                <a:shade val="98000"/>
-                <a:lumMod val="102000"/>
-              </a:schemeClr>
-            </a:gs>
-            <a:gs pos="50000">
-              <a:schemeClr val="phClr">
-                <a:tint val="98000"/>
-                <a:satMod val="130000"/>
-                <a:shade val="90000"/>
-                <a:lumMod val="103000"/>
-              </a:schemeClr>
-            </a:gs>
-            <a:gs pos="100000">
-              <a:schemeClr val="phClr">
-                <a:shade val="63000"/>
-                <a:satMod val="120000"/>
-              </a:schemeClr>
-            </a:gs>
-          </a:gsLst>
-          <a:lin ang="5400000" scaled="0"/>
-        </a:gradFill>
-      </a:bgFillStyleLst>
-    </a:fmtScheme>
-  </a:themeElements>
-  <a:objectDefaults/>
-  <a:extraClrSchemeLst/>
-  <a:extLst>
-    <a:ext uri="{05A4C25C-085E-4340-85A3-A5531E510DB2}">
-      <thm15:themeFamily xmlns:thm15="http://schemas.microsoft.com/office/thememl/2012/main" name="Office Theme" id="{62F939B6-93AF-4DB8-9C6B-D6C7DFDC589F}" vid="{4A3C46E8-61CC-4603-A589-7422A47A8E4A}"/>
-    </a:ext>
-  </a:extLst>
-</a:theme>
 </file>
</xml_diff>